<commit_message>
Arrange UML folders and add sequence diagram paths
</commit_message>
<xml_diff>
--- a/diagrams/requirements/prototyping/textPrototypeCLI.pptx
+++ b/diagrams/requirements/prototyping/textPrototypeCLI.pptx
@@ -1,17 +1,14 @@
 
 <file path=ppt/presentation.xml><?xml version="1.0" encoding="utf-8"?>
-<p:presentation xmlns:a="http://schemas.openxmlformats.org/drawingml/2006/main" xmlns:r="http://schemas.openxmlformats.org/officeDocument/2006/relationships" xmlns:p="http://schemas.openxmlformats.org/presentationml/2006/main" firstSlideNum="46" showSpecialPlsOnTitleSld="0">
+<p:presentation xmlns:a="http://schemas.openxmlformats.org/drawingml/2006/main" xmlns:r="http://schemas.openxmlformats.org/officeDocument/2006/relationships" xmlns:p="http://schemas.openxmlformats.org/presentationml/2006/main" saveSubsetFonts="1">
   <p:sldMasterIdLst>
     <p:sldMasterId id="2147483648" r:id="rId1"/>
   </p:sldMasterIdLst>
-  <p:notesMasterIdLst>
-    <p:notesMasterId r:id="rId3"/>
-  </p:notesMasterIdLst>
   <p:sldIdLst>
-    <p:sldId id="498" r:id="rId2"/>
+    <p:sldId id="256" r:id="rId2"/>
   </p:sldIdLst>
   <p:sldSz cx="9144000" cy="6858000" type="screen4x3"/>
-  <p:notesSz cx="7099300" cy="10234613"/>
+  <p:notesSz cx="6858000" cy="9144000"/>
   <p:defaultTextStyle>
     <a:defPPr>
       <a:defRPr lang="en-US"/>
@@ -110,440 +107,6 @@
 </p:presentation>
 </file>
 
-<file path=ppt/notesMasters/notesMaster1.xml><?xml version="1.0" encoding="utf-8"?>
-<p:notesMaster xmlns:a="http://schemas.openxmlformats.org/drawingml/2006/main" xmlns:r="http://schemas.openxmlformats.org/officeDocument/2006/relationships" xmlns:p="http://schemas.openxmlformats.org/presentationml/2006/main">
-  <p:cSld>
-    <p:bg>
-      <p:bgRef idx="1001">
-        <a:schemeClr val="bg1"/>
-      </p:bgRef>
-    </p:bg>
-    <p:spTree>
-      <p:nvGrpSpPr>
-        <p:cNvPr id="1" name=""/>
-        <p:cNvGrpSpPr/>
-        <p:nvPr/>
-      </p:nvGrpSpPr>
-      <p:grpSpPr>
-        <a:xfrm>
-          <a:off x="0" y="0"/>
-          <a:ext cx="0" cy="0"/>
-          <a:chOff x="0" y="0"/>
-          <a:chExt cx="0" cy="0"/>
-        </a:xfrm>
-      </p:grpSpPr>
-      <p:sp>
-        <p:nvSpPr>
-          <p:cNvPr id="2" name="Header Placeholder 1"/>
-          <p:cNvSpPr>
-            <a:spLocks noGrp="1"/>
-          </p:cNvSpPr>
-          <p:nvPr>
-            <p:ph type="hdr" sz="quarter"/>
-          </p:nvPr>
-        </p:nvSpPr>
-        <p:spPr>
-          <a:xfrm>
-            <a:off x="0" y="0"/>
-            <a:ext cx="3076575" cy="511175"/>
-          </a:xfrm>
-          <a:prstGeom prst="rect">
-            <a:avLst/>
-          </a:prstGeom>
-        </p:spPr>
-        <p:txBody>
-          <a:bodyPr vert="horz" lIns="91440" tIns="45720" rIns="91440" bIns="45720" rtlCol="0"/>
-          <a:lstStyle>
-            <a:lvl1pPr algn="l">
-              <a:defRPr sz="1200"/>
-            </a:lvl1pPr>
-          </a:lstStyle>
-          <a:p>
-            <a:endParaRPr lang="en-US"/>
-          </a:p>
-        </p:txBody>
-      </p:sp>
-      <p:sp>
-        <p:nvSpPr>
-          <p:cNvPr id="3" name="Date Placeholder 2"/>
-          <p:cNvSpPr>
-            <a:spLocks noGrp="1"/>
-          </p:cNvSpPr>
-          <p:nvPr>
-            <p:ph type="dt" idx="1"/>
-          </p:nvPr>
-        </p:nvSpPr>
-        <p:spPr>
-          <a:xfrm>
-            <a:off x="4021138" y="0"/>
-            <a:ext cx="3076575" cy="511175"/>
-          </a:xfrm>
-          <a:prstGeom prst="rect">
-            <a:avLst/>
-          </a:prstGeom>
-        </p:spPr>
-        <p:txBody>
-          <a:bodyPr vert="horz" lIns="91440" tIns="45720" rIns="91440" bIns="45720" rtlCol="0"/>
-          <a:lstStyle>
-            <a:lvl1pPr algn="r">
-              <a:defRPr sz="1200"/>
-            </a:lvl1pPr>
-          </a:lstStyle>
-          <a:p>
-            <a:fld id="{C4CB16A5-0670-4B7E-8131-AB3DA198B062}" type="datetimeFigureOut">
-              <a:rPr lang="en-US" smtClean="0"/>
-              <a:t>5/16/2017</a:t>
-            </a:fld>
-            <a:endParaRPr lang="en-US"/>
-          </a:p>
-        </p:txBody>
-      </p:sp>
-      <p:sp>
-        <p:nvSpPr>
-          <p:cNvPr id="4" name="Slide Image Placeholder 3"/>
-          <p:cNvSpPr>
-            <a:spLocks noGrp="1" noRot="1" noChangeAspect="1"/>
-          </p:cNvSpPr>
-          <p:nvPr>
-            <p:ph type="sldImg" idx="2"/>
-          </p:nvPr>
-        </p:nvSpPr>
-        <p:spPr>
-          <a:xfrm>
-            <a:off x="992188" y="768350"/>
-            <a:ext cx="5114925" cy="3836988"/>
-          </a:xfrm>
-          <a:prstGeom prst="rect">
-            <a:avLst/>
-          </a:prstGeom>
-          <a:noFill/>
-          <a:ln w="12700">
-            <a:solidFill>
-              <a:prstClr val="black"/>
-            </a:solidFill>
-          </a:ln>
-        </p:spPr>
-        <p:txBody>
-          <a:bodyPr vert="horz" lIns="91440" tIns="45720" rIns="91440" bIns="45720" rtlCol="0" anchor="ctr"/>
-          <a:lstStyle/>
-          <a:p>
-            <a:endParaRPr lang="en-US"/>
-          </a:p>
-        </p:txBody>
-      </p:sp>
-      <p:sp>
-        <p:nvSpPr>
-          <p:cNvPr id="5" name="Notes Placeholder 4"/>
-          <p:cNvSpPr>
-            <a:spLocks noGrp="1"/>
-          </p:cNvSpPr>
-          <p:nvPr>
-            <p:ph type="body" sz="quarter" idx="3"/>
-          </p:nvPr>
-        </p:nvSpPr>
-        <p:spPr>
-          <a:xfrm>
-            <a:off x="709613" y="4860925"/>
-            <a:ext cx="5680075" cy="4605338"/>
-          </a:xfrm>
-          <a:prstGeom prst="rect">
-            <a:avLst/>
-          </a:prstGeom>
-        </p:spPr>
-        <p:txBody>
-          <a:bodyPr vert="horz" lIns="91440" tIns="45720" rIns="91440" bIns="45720" rtlCol="0">
-            <a:normAutofit/>
-          </a:bodyPr>
-          <a:lstStyle/>
-          <a:p>
-            <a:pPr lvl="0"/>
-            <a:r>
-              <a:rPr lang="en-US" smtClean="0"/>
-              <a:t>Click to edit Master text styles</a:t>
-            </a:r>
-          </a:p>
-          <a:p>
-            <a:pPr lvl="1"/>
-            <a:r>
-              <a:rPr lang="en-US" smtClean="0"/>
-              <a:t>Second level</a:t>
-            </a:r>
-          </a:p>
-          <a:p>
-            <a:pPr lvl="2"/>
-            <a:r>
-              <a:rPr lang="en-US" smtClean="0"/>
-              <a:t>Third level</a:t>
-            </a:r>
-          </a:p>
-          <a:p>
-            <a:pPr lvl="3"/>
-            <a:r>
-              <a:rPr lang="en-US" smtClean="0"/>
-              <a:t>Fourth level</a:t>
-            </a:r>
-          </a:p>
-          <a:p>
-            <a:pPr lvl="4"/>
-            <a:r>
-              <a:rPr lang="en-US" smtClean="0"/>
-              <a:t>Fifth level</a:t>
-            </a:r>
-            <a:endParaRPr lang="en-US"/>
-          </a:p>
-        </p:txBody>
-      </p:sp>
-      <p:sp>
-        <p:nvSpPr>
-          <p:cNvPr id="6" name="Footer Placeholder 5"/>
-          <p:cNvSpPr>
-            <a:spLocks noGrp="1"/>
-          </p:cNvSpPr>
-          <p:nvPr>
-            <p:ph type="ftr" sz="quarter" idx="4"/>
-          </p:nvPr>
-        </p:nvSpPr>
-        <p:spPr>
-          <a:xfrm>
-            <a:off x="0" y="9721850"/>
-            <a:ext cx="3076575" cy="511175"/>
-          </a:xfrm>
-          <a:prstGeom prst="rect">
-            <a:avLst/>
-          </a:prstGeom>
-        </p:spPr>
-        <p:txBody>
-          <a:bodyPr vert="horz" lIns="91440" tIns="45720" rIns="91440" bIns="45720" rtlCol="0" anchor="b"/>
-          <a:lstStyle>
-            <a:lvl1pPr algn="l">
-              <a:defRPr sz="1200"/>
-            </a:lvl1pPr>
-          </a:lstStyle>
-          <a:p>
-            <a:endParaRPr lang="en-US"/>
-          </a:p>
-        </p:txBody>
-      </p:sp>
-      <p:sp>
-        <p:nvSpPr>
-          <p:cNvPr id="7" name="Slide Number Placeholder 6"/>
-          <p:cNvSpPr>
-            <a:spLocks noGrp="1"/>
-          </p:cNvSpPr>
-          <p:nvPr>
-            <p:ph type="sldNum" sz="quarter" idx="5"/>
-          </p:nvPr>
-        </p:nvSpPr>
-        <p:spPr>
-          <a:xfrm>
-            <a:off x="4021138" y="9721850"/>
-            <a:ext cx="3076575" cy="511175"/>
-          </a:xfrm>
-          <a:prstGeom prst="rect">
-            <a:avLst/>
-          </a:prstGeom>
-        </p:spPr>
-        <p:txBody>
-          <a:bodyPr vert="horz" lIns="91440" tIns="45720" rIns="91440" bIns="45720" rtlCol="0" anchor="b"/>
-          <a:lstStyle>
-            <a:lvl1pPr algn="r">
-              <a:defRPr sz="1200"/>
-            </a:lvl1pPr>
-          </a:lstStyle>
-          <a:p>
-            <a:fld id="{2359FD0C-6A23-41D2-9051-83CC13FCA920}" type="slidenum">
-              <a:rPr lang="en-US" smtClean="0"/>
-              <a:t>‹#›</a:t>
-            </a:fld>
-            <a:endParaRPr lang="en-US"/>
-          </a:p>
-        </p:txBody>
-      </p:sp>
-    </p:spTree>
-    <p:extLst>
-      <p:ext uri="{BB962C8B-B14F-4D97-AF65-F5344CB8AC3E}">
-        <p14:creationId xmlns:p14="http://schemas.microsoft.com/office/powerpoint/2010/main" val="117883665"/>
-      </p:ext>
-    </p:extLst>
-  </p:cSld>
-  <p:clrMap bg1="lt1" tx1="dk1" bg2="lt2" tx2="dk2" accent1="accent1" accent2="accent2" accent3="accent3" accent4="accent4" accent5="accent5" accent6="accent6" hlink="hlink" folHlink="folHlink"/>
-  <p:notesStyle>
-    <a:lvl1pPr marL="0" algn="l" defTabSz="914400" rtl="0" eaLnBrk="1" latinLnBrk="0" hangingPunct="1">
-      <a:defRPr sz="1200" kern="1200">
-        <a:solidFill>
-          <a:schemeClr val="tx1"/>
-        </a:solidFill>
-        <a:latin typeface="+mn-lt"/>
-        <a:ea typeface="+mn-ea"/>
-        <a:cs typeface="+mn-cs"/>
-      </a:defRPr>
-    </a:lvl1pPr>
-    <a:lvl2pPr marL="457200" algn="l" defTabSz="914400" rtl="0" eaLnBrk="1" latinLnBrk="0" hangingPunct="1">
-      <a:defRPr sz="1200" kern="1200">
-        <a:solidFill>
-          <a:schemeClr val="tx1"/>
-        </a:solidFill>
-        <a:latin typeface="+mn-lt"/>
-        <a:ea typeface="+mn-ea"/>
-        <a:cs typeface="+mn-cs"/>
-      </a:defRPr>
-    </a:lvl2pPr>
-    <a:lvl3pPr marL="914400" algn="l" defTabSz="914400" rtl="0" eaLnBrk="1" latinLnBrk="0" hangingPunct="1">
-      <a:defRPr sz="1200" kern="1200">
-        <a:solidFill>
-          <a:schemeClr val="tx1"/>
-        </a:solidFill>
-        <a:latin typeface="+mn-lt"/>
-        <a:ea typeface="+mn-ea"/>
-        <a:cs typeface="+mn-cs"/>
-      </a:defRPr>
-    </a:lvl3pPr>
-    <a:lvl4pPr marL="1371600" algn="l" defTabSz="914400" rtl="0" eaLnBrk="1" latinLnBrk="0" hangingPunct="1">
-      <a:defRPr sz="1200" kern="1200">
-        <a:solidFill>
-          <a:schemeClr val="tx1"/>
-        </a:solidFill>
-        <a:latin typeface="+mn-lt"/>
-        <a:ea typeface="+mn-ea"/>
-        <a:cs typeface="+mn-cs"/>
-      </a:defRPr>
-    </a:lvl4pPr>
-    <a:lvl5pPr marL="1828800" algn="l" defTabSz="914400" rtl="0" eaLnBrk="1" latinLnBrk="0" hangingPunct="1">
-      <a:defRPr sz="1200" kern="1200">
-        <a:solidFill>
-          <a:schemeClr val="tx1"/>
-        </a:solidFill>
-        <a:latin typeface="+mn-lt"/>
-        <a:ea typeface="+mn-ea"/>
-        <a:cs typeface="+mn-cs"/>
-      </a:defRPr>
-    </a:lvl5pPr>
-    <a:lvl6pPr marL="2286000" algn="l" defTabSz="914400" rtl="0" eaLnBrk="1" latinLnBrk="0" hangingPunct="1">
-      <a:defRPr sz="1200" kern="1200">
-        <a:solidFill>
-          <a:schemeClr val="tx1"/>
-        </a:solidFill>
-        <a:latin typeface="+mn-lt"/>
-        <a:ea typeface="+mn-ea"/>
-        <a:cs typeface="+mn-cs"/>
-      </a:defRPr>
-    </a:lvl6pPr>
-    <a:lvl7pPr marL="2743200" algn="l" defTabSz="914400" rtl="0" eaLnBrk="1" latinLnBrk="0" hangingPunct="1">
-      <a:defRPr sz="1200" kern="1200">
-        <a:solidFill>
-          <a:schemeClr val="tx1"/>
-        </a:solidFill>
-        <a:latin typeface="+mn-lt"/>
-        <a:ea typeface="+mn-ea"/>
-        <a:cs typeface="+mn-cs"/>
-      </a:defRPr>
-    </a:lvl7pPr>
-    <a:lvl8pPr marL="3200400" algn="l" defTabSz="914400" rtl="0" eaLnBrk="1" latinLnBrk="0" hangingPunct="1">
-      <a:defRPr sz="1200" kern="1200">
-        <a:solidFill>
-          <a:schemeClr val="tx1"/>
-        </a:solidFill>
-        <a:latin typeface="+mn-lt"/>
-        <a:ea typeface="+mn-ea"/>
-        <a:cs typeface="+mn-cs"/>
-      </a:defRPr>
-    </a:lvl8pPr>
-    <a:lvl9pPr marL="3657600" algn="l" defTabSz="914400" rtl="0" eaLnBrk="1" latinLnBrk="0" hangingPunct="1">
-      <a:defRPr sz="1200" kern="1200">
-        <a:solidFill>
-          <a:schemeClr val="tx1"/>
-        </a:solidFill>
-        <a:latin typeface="+mn-lt"/>
-        <a:ea typeface="+mn-ea"/>
-        <a:cs typeface="+mn-cs"/>
-      </a:defRPr>
-    </a:lvl9pPr>
-  </p:notesStyle>
-</p:notesMaster>
-</file>
-
-<file path=ppt/notesSlides/notesSlide1.xml><?xml version="1.0" encoding="utf-8"?>
-<p:notes xmlns:a="http://schemas.openxmlformats.org/drawingml/2006/main" xmlns:r="http://schemas.openxmlformats.org/officeDocument/2006/relationships" xmlns:p="http://schemas.openxmlformats.org/presentationml/2006/main">
-  <p:cSld>
-    <p:spTree>
-      <p:nvGrpSpPr>
-        <p:cNvPr id="1" name=""/>
-        <p:cNvGrpSpPr/>
-        <p:nvPr/>
-      </p:nvGrpSpPr>
-      <p:grpSpPr>
-        <a:xfrm>
-          <a:off x="0" y="0"/>
-          <a:ext cx="0" cy="0"/>
-          <a:chOff x="0" y="0"/>
-          <a:chExt cx="0" cy="0"/>
-        </a:xfrm>
-      </p:grpSpPr>
-      <p:sp>
-        <p:nvSpPr>
-          <p:cNvPr id="2" name="Slide Image Placeholder 1"/>
-          <p:cNvSpPr>
-            <a:spLocks noGrp="1" noRot="1" noChangeAspect="1"/>
-          </p:cNvSpPr>
-          <p:nvPr>
-            <p:ph type="sldImg"/>
-          </p:nvPr>
-        </p:nvSpPr>
-        <p:spPr/>
-      </p:sp>
-      <p:sp>
-        <p:nvSpPr>
-          <p:cNvPr id="3" name="Notes Placeholder 2"/>
-          <p:cNvSpPr>
-            <a:spLocks noGrp="1"/>
-          </p:cNvSpPr>
-          <p:nvPr>
-            <p:ph type="body" idx="1"/>
-          </p:nvPr>
-        </p:nvSpPr>
-        <p:spPr/>
-        <p:txBody>
-          <a:bodyPr>
-            <a:normAutofit/>
-          </a:bodyPr>
-          <a:lstStyle/>
-          <a:p>
-            <a:endParaRPr lang="en-US"/>
-          </a:p>
-        </p:txBody>
-      </p:sp>
-      <p:sp>
-        <p:nvSpPr>
-          <p:cNvPr id="4" name="Slide Number Placeholder 3"/>
-          <p:cNvSpPr>
-            <a:spLocks noGrp="1"/>
-          </p:cNvSpPr>
-          <p:nvPr>
-            <p:ph type="sldNum" sz="quarter" idx="10"/>
-          </p:nvPr>
-        </p:nvSpPr>
-        <p:spPr/>
-        <p:txBody>
-          <a:bodyPr/>
-          <a:lstStyle/>
-          <a:p>
-            <a:fld id="{D8AAB797-2628-476A-9ECD-6773D97C2656}" type="slidenum">
-              <a:rPr lang="en-US" smtClean="0"/>
-              <a:pPr/>
-              <a:t>46</a:t>
-            </a:fld>
-            <a:endParaRPr lang="en-US"/>
-          </a:p>
-        </p:txBody>
-      </p:sp>
-    </p:spTree>
-  </p:cSld>
-  <p:clrMapOvr>
-    <a:masterClrMapping/>
-  </p:clrMapOvr>
-</p:notes>
-</file>
-
 <file path=ppt/slideLayouts/slideLayout1.xml><?xml version="1.0" encoding="utf-8"?>
 <p:sldLayout xmlns:a="http://schemas.openxmlformats.org/drawingml/2006/main" xmlns:r="http://schemas.openxmlformats.org/officeDocument/2006/relationships" xmlns:p="http://schemas.openxmlformats.org/presentationml/2006/main" type="title" preserve="1">
   <p:cSld name="Title Slide">
@@ -585,7 +148,7 @@
               <a:rPr lang="en-US" smtClean="0"/>
               <a:t>Click to edit Master title style</a:t>
             </a:r>
-            <a:endParaRPr lang="en-US"/>
+            <a:endParaRPr lang="en-SG"/>
           </a:p>
         </p:txBody>
       </p:sp>
@@ -704,7 +267,7 @@
               <a:rPr lang="en-US" smtClean="0"/>
               <a:t>Click to edit Master subtitle style</a:t>
             </a:r>
-            <a:endParaRPr lang="en-US"/>
+            <a:endParaRPr lang="en-SG"/>
           </a:p>
         </p:txBody>
       </p:sp>
@@ -723,7 +286,11 @@
           <a:bodyPr/>
           <a:lstStyle/>
           <a:p>
-            <a:endParaRPr lang="en-US"/>
+            <a:fld id="{A0F86979-30DA-49EE-A740-32EBA6D2B7DE}" type="datetimeFigureOut">
+              <a:rPr lang="en-SG" smtClean="0"/>
+              <a:t>2/6/2017</a:t>
+            </a:fld>
+            <a:endParaRPr lang="en-SG"/>
           </a:p>
         </p:txBody>
       </p:sp>
@@ -742,7 +309,7 @@
           <a:bodyPr/>
           <a:lstStyle/>
           <a:p>
-            <a:endParaRPr lang="en-US"/>
+            <a:endParaRPr lang="en-SG"/>
           </a:p>
         </p:txBody>
       </p:sp>
@@ -761,16 +328,20 @@
           <a:bodyPr/>
           <a:lstStyle/>
           <a:p>
-            <a:fld id="{5B8905EB-9186-4B9B-BEF9-C6B1CD50847D}" type="slidenum">
-              <a:rPr lang="en-US" smtClean="0"/>
-              <a:pPr/>
+            <a:fld id="{EBF7C7F7-E270-4260-A412-76A75D6182AD}" type="slidenum">
+              <a:rPr lang="en-SG" smtClean="0"/>
               <a:t>‹#›</a:t>
             </a:fld>
-            <a:endParaRPr lang="en-US"/>
+            <a:endParaRPr lang="en-SG"/>
           </a:p>
         </p:txBody>
       </p:sp>
     </p:spTree>
+    <p:extLst>
+      <p:ext uri="{BB962C8B-B14F-4D97-AF65-F5344CB8AC3E}">
+        <p14:creationId xmlns:p14="http://schemas.microsoft.com/office/powerpoint/2010/main" val="135796274"/>
+      </p:ext>
+    </p:extLst>
   </p:cSld>
   <p:clrMapOvr>
     <a:masterClrMapping/>
@@ -814,7 +385,7 @@
               <a:rPr lang="en-US" smtClean="0"/>
               <a:t>Click to edit Master title style</a:t>
             </a:r>
-            <a:endParaRPr lang="en-US"/>
+            <a:endParaRPr lang="en-SG"/>
           </a:p>
         </p:txBody>
       </p:sp>
@@ -866,7 +437,7 @@
               <a:rPr lang="en-US" smtClean="0"/>
               <a:t>Fifth level</a:t>
             </a:r>
-            <a:endParaRPr lang="en-US"/>
+            <a:endParaRPr lang="en-SG"/>
           </a:p>
         </p:txBody>
       </p:sp>
@@ -885,7 +456,11 @@
           <a:bodyPr/>
           <a:lstStyle/>
           <a:p>
-            <a:endParaRPr lang="en-US"/>
+            <a:fld id="{A0F86979-30DA-49EE-A740-32EBA6D2B7DE}" type="datetimeFigureOut">
+              <a:rPr lang="en-SG" smtClean="0"/>
+              <a:t>2/6/2017</a:t>
+            </a:fld>
+            <a:endParaRPr lang="en-SG"/>
           </a:p>
         </p:txBody>
       </p:sp>
@@ -904,7 +479,7 @@
           <a:bodyPr/>
           <a:lstStyle/>
           <a:p>
-            <a:endParaRPr lang="en-US"/>
+            <a:endParaRPr lang="en-SG"/>
           </a:p>
         </p:txBody>
       </p:sp>
@@ -923,16 +498,20 @@
           <a:bodyPr/>
           <a:lstStyle/>
           <a:p>
-            <a:fld id="{5B8905EB-9186-4B9B-BEF9-C6B1CD50847D}" type="slidenum">
-              <a:rPr lang="en-US" smtClean="0"/>
-              <a:pPr/>
+            <a:fld id="{EBF7C7F7-E270-4260-A412-76A75D6182AD}" type="slidenum">
+              <a:rPr lang="en-SG" smtClean="0"/>
               <a:t>‹#›</a:t>
             </a:fld>
-            <a:endParaRPr lang="en-US"/>
+            <a:endParaRPr lang="en-SG"/>
           </a:p>
         </p:txBody>
       </p:sp>
     </p:spTree>
+    <p:extLst>
+      <p:ext uri="{BB962C8B-B14F-4D97-AF65-F5344CB8AC3E}">
+        <p14:creationId xmlns:p14="http://schemas.microsoft.com/office/powerpoint/2010/main" val="3528568514"/>
+      </p:ext>
+    </p:extLst>
   </p:cSld>
   <p:clrMapOvr>
     <a:masterClrMapping/>
@@ -981,7 +560,7 @@
               <a:rPr lang="en-US" smtClean="0"/>
               <a:t>Click to edit Master title style</a:t>
             </a:r>
-            <a:endParaRPr lang="en-US"/>
+            <a:endParaRPr lang="en-SG"/>
           </a:p>
         </p:txBody>
       </p:sp>
@@ -1038,7 +617,7 @@
               <a:rPr lang="en-US" smtClean="0"/>
               <a:t>Fifth level</a:t>
             </a:r>
-            <a:endParaRPr lang="en-US"/>
+            <a:endParaRPr lang="en-SG"/>
           </a:p>
         </p:txBody>
       </p:sp>
@@ -1057,7 +636,11 @@
           <a:bodyPr/>
           <a:lstStyle/>
           <a:p>
-            <a:endParaRPr lang="en-US"/>
+            <a:fld id="{A0F86979-30DA-49EE-A740-32EBA6D2B7DE}" type="datetimeFigureOut">
+              <a:rPr lang="en-SG" smtClean="0"/>
+              <a:t>2/6/2017</a:t>
+            </a:fld>
+            <a:endParaRPr lang="en-SG"/>
           </a:p>
         </p:txBody>
       </p:sp>
@@ -1076,7 +659,7 @@
           <a:bodyPr/>
           <a:lstStyle/>
           <a:p>
-            <a:endParaRPr lang="en-US"/>
+            <a:endParaRPr lang="en-SG"/>
           </a:p>
         </p:txBody>
       </p:sp>
@@ -1095,16 +678,20 @@
           <a:bodyPr/>
           <a:lstStyle/>
           <a:p>
-            <a:fld id="{5B8905EB-9186-4B9B-BEF9-C6B1CD50847D}" type="slidenum">
-              <a:rPr lang="en-US" smtClean="0"/>
-              <a:pPr/>
+            <a:fld id="{EBF7C7F7-E270-4260-A412-76A75D6182AD}" type="slidenum">
+              <a:rPr lang="en-SG" smtClean="0"/>
               <a:t>‹#›</a:t>
             </a:fld>
-            <a:endParaRPr lang="en-US"/>
+            <a:endParaRPr lang="en-SG"/>
           </a:p>
         </p:txBody>
       </p:sp>
     </p:spTree>
+    <p:extLst>
+      <p:ext uri="{BB962C8B-B14F-4D97-AF65-F5344CB8AC3E}">
+        <p14:creationId xmlns:p14="http://schemas.microsoft.com/office/powerpoint/2010/main" val="2418564099"/>
+      </p:ext>
+    </p:extLst>
   </p:cSld>
   <p:clrMapOvr>
     <a:masterClrMapping/>
@@ -1139,33 +726,16 @@
             <p:ph type="title"/>
           </p:nvPr>
         </p:nvSpPr>
-        <p:spPr>
-          <a:xfrm>
-            <a:off x="457200" y="274638"/>
-            <a:ext cx="8229600" cy="792162"/>
-          </a:xfrm>
-        </p:spPr>
-        <p:txBody>
-          <a:bodyPr>
-            <a:normAutofit/>
-          </a:bodyPr>
-          <a:lstStyle>
-            <a:lvl1pPr algn="l">
-              <a:defRPr sz="3600">
-                <a:solidFill>
-                  <a:schemeClr val="accent6">
-                    <a:lumMod val="75000"/>
-                  </a:schemeClr>
-                </a:solidFill>
-              </a:defRPr>
-            </a:lvl1pPr>
-          </a:lstStyle>
-          <a:p>
-            <a:r>
-              <a:rPr lang="en-US" dirty="0" smtClean="0"/>
+        <p:spPr/>
+        <p:txBody>
+          <a:bodyPr/>
+          <a:lstStyle/>
+          <a:p>
+            <a:r>
+              <a:rPr lang="en-US" smtClean="0"/>
               <a:t>Click to edit Master title style</a:t>
             </a:r>
-            <a:endParaRPr lang="en-US" dirty="0"/>
+            <a:endParaRPr lang="en-SG"/>
           </a:p>
         </p:txBody>
       </p:sp>
@@ -1179,99 +749,123 @@
             <p:ph idx="1"/>
           </p:nvPr>
         </p:nvSpPr>
-        <p:spPr>
-          <a:xfrm>
-            <a:off x="457200" y="1219200"/>
-            <a:ext cx="8229600" cy="1754326"/>
-          </a:xfrm>
-        </p:spPr>
-        <p:txBody>
-          <a:bodyPr>
-            <a:spAutoFit/>
-          </a:bodyPr>
-          <a:lstStyle>
-            <a:lvl1pPr>
-              <a:buSzPct val="50000"/>
-              <a:buFont typeface="Wingdings" pitchFamily="2" charset="2"/>
-              <a:buChar char="q"/>
-              <a:defRPr sz="2200">
-                <a:latin typeface="Cambria" pitchFamily="18" charset="0"/>
-              </a:defRPr>
-            </a:lvl1pPr>
-            <a:lvl2pPr>
-              <a:buSzPct val="75000"/>
-              <a:buFont typeface="Courier New" pitchFamily="49" charset="0"/>
-              <a:buChar char="o"/>
-              <a:defRPr sz="2000">
-                <a:latin typeface="Cambria" pitchFamily="18" charset="0"/>
-              </a:defRPr>
-            </a:lvl2pPr>
-            <a:lvl3pPr>
-              <a:defRPr sz="1800">
-                <a:latin typeface="Cambria" pitchFamily="18" charset="0"/>
-              </a:defRPr>
-            </a:lvl3pPr>
-            <a:lvl4pPr>
-              <a:defRPr sz="1600">
-                <a:latin typeface="Cambria" pitchFamily="18" charset="0"/>
-              </a:defRPr>
-            </a:lvl4pPr>
-            <a:lvl5pPr>
-              <a:defRPr sz="1600">
-                <a:latin typeface="Cambria" pitchFamily="18" charset="0"/>
-              </a:defRPr>
-            </a:lvl5pPr>
-          </a:lstStyle>
+        <p:spPr/>
+        <p:txBody>
+          <a:bodyPr/>
+          <a:lstStyle/>
           <a:p>
             <a:pPr lvl="0"/>
             <a:r>
-              <a:rPr lang="en-US" dirty="0" smtClean="0"/>
+              <a:rPr lang="en-US" smtClean="0"/>
               <a:t>Click to edit Master text styles</a:t>
             </a:r>
           </a:p>
           <a:p>
             <a:pPr lvl="1"/>
             <a:r>
-              <a:rPr lang="en-US" dirty="0" smtClean="0"/>
+              <a:rPr lang="en-US" smtClean="0"/>
               <a:t>Second level</a:t>
             </a:r>
           </a:p>
           <a:p>
             <a:pPr lvl="2"/>
             <a:r>
-              <a:rPr lang="en-US" dirty="0" smtClean="0"/>
+              <a:rPr lang="en-US" smtClean="0"/>
               <a:t>Third level</a:t>
             </a:r>
           </a:p>
           <a:p>
             <a:pPr lvl="3"/>
             <a:r>
-              <a:rPr lang="en-US" dirty="0" smtClean="0"/>
+              <a:rPr lang="en-US" smtClean="0"/>
               <a:t>Fourth level</a:t>
             </a:r>
           </a:p>
           <a:p>
             <a:pPr lvl="4"/>
             <a:r>
-              <a:rPr lang="en-US" dirty="0" smtClean="0"/>
+              <a:rPr lang="en-US" smtClean="0"/>
               <a:t>Fifth level</a:t>
             </a:r>
-            <a:endParaRPr lang="en-US" dirty="0"/>
+            <a:endParaRPr lang="en-SG"/>
+          </a:p>
+        </p:txBody>
+      </p:sp>
+      <p:sp>
+        <p:nvSpPr>
+          <p:cNvPr id="4" name="Date Placeholder 3"/>
+          <p:cNvSpPr>
+            <a:spLocks noGrp="1"/>
+          </p:cNvSpPr>
+          <p:nvPr>
+            <p:ph type="dt" sz="half" idx="10"/>
+          </p:nvPr>
+        </p:nvSpPr>
+        <p:spPr/>
+        <p:txBody>
+          <a:bodyPr/>
+          <a:lstStyle/>
+          <a:p>
+            <a:fld id="{A0F86979-30DA-49EE-A740-32EBA6D2B7DE}" type="datetimeFigureOut">
+              <a:rPr lang="en-SG" smtClean="0"/>
+              <a:t>2/6/2017</a:t>
+            </a:fld>
+            <a:endParaRPr lang="en-SG"/>
+          </a:p>
+        </p:txBody>
+      </p:sp>
+      <p:sp>
+        <p:nvSpPr>
+          <p:cNvPr id="5" name="Footer Placeholder 4"/>
+          <p:cNvSpPr>
+            <a:spLocks noGrp="1"/>
+          </p:cNvSpPr>
+          <p:nvPr>
+            <p:ph type="ftr" sz="quarter" idx="11"/>
+          </p:nvPr>
+        </p:nvSpPr>
+        <p:spPr/>
+        <p:txBody>
+          <a:bodyPr/>
+          <a:lstStyle/>
+          <a:p>
+            <a:endParaRPr lang="en-SG"/>
+          </a:p>
+        </p:txBody>
+      </p:sp>
+      <p:sp>
+        <p:nvSpPr>
+          <p:cNvPr id="6" name="Slide Number Placeholder 5"/>
+          <p:cNvSpPr>
+            <a:spLocks noGrp="1"/>
+          </p:cNvSpPr>
+          <p:nvPr>
+            <p:ph type="sldNum" sz="quarter" idx="12"/>
+          </p:nvPr>
+        </p:nvSpPr>
+        <p:spPr/>
+        <p:txBody>
+          <a:bodyPr/>
+          <a:lstStyle/>
+          <a:p>
+            <a:fld id="{EBF7C7F7-E270-4260-A412-76A75D6182AD}" type="slidenum">
+              <a:rPr lang="en-SG" smtClean="0"/>
+              <a:t>‹#›</a:t>
+            </a:fld>
+            <a:endParaRPr lang="en-SG"/>
           </a:p>
         </p:txBody>
       </p:sp>
     </p:spTree>
+    <p:extLst>
+      <p:ext uri="{BB962C8B-B14F-4D97-AF65-F5344CB8AC3E}">
+        <p14:creationId xmlns:p14="http://schemas.microsoft.com/office/powerpoint/2010/main" val="4201411315"/>
+      </p:ext>
+    </p:extLst>
   </p:cSld>
   <p:clrMapOvr>
     <a:masterClrMapping/>
   </p:clrMapOvr>
-  <p:timing>
-    <p:tnLst>
-      <p:par>
-        <p:cTn id="1" dur="indefinite" restart="never" nodeType="tmRoot"/>
-      </p:par>
-    </p:tnLst>
-  </p:timing>
 </p:sldLayout>
 </file>
 
@@ -1320,7 +914,7 @@
               <a:rPr lang="en-US" smtClean="0"/>
               <a:t>Click to edit Master title style</a:t>
             </a:r>
-            <a:endParaRPr lang="en-US"/>
+            <a:endParaRPr lang="en-SG"/>
           </a:p>
         </p:txBody>
       </p:sp>
@@ -1458,7 +1052,11 @@
           <a:bodyPr/>
           <a:lstStyle/>
           <a:p>
-            <a:endParaRPr lang="en-US"/>
+            <a:fld id="{A0F86979-30DA-49EE-A740-32EBA6D2B7DE}" type="datetimeFigureOut">
+              <a:rPr lang="en-SG" smtClean="0"/>
+              <a:t>2/6/2017</a:t>
+            </a:fld>
+            <a:endParaRPr lang="en-SG"/>
           </a:p>
         </p:txBody>
       </p:sp>
@@ -1477,7 +1075,7 @@
           <a:bodyPr/>
           <a:lstStyle/>
           <a:p>
-            <a:endParaRPr lang="en-US"/>
+            <a:endParaRPr lang="en-SG"/>
           </a:p>
         </p:txBody>
       </p:sp>
@@ -1496,16 +1094,20 @@
           <a:bodyPr/>
           <a:lstStyle/>
           <a:p>
-            <a:fld id="{5B8905EB-9186-4B9B-BEF9-C6B1CD50847D}" type="slidenum">
-              <a:rPr lang="en-US" smtClean="0"/>
-              <a:pPr/>
+            <a:fld id="{EBF7C7F7-E270-4260-A412-76A75D6182AD}" type="slidenum">
+              <a:rPr lang="en-SG" smtClean="0"/>
               <a:t>‹#›</a:t>
             </a:fld>
-            <a:endParaRPr lang="en-US"/>
+            <a:endParaRPr lang="en-SG"/>
           </a:p>
         </p:txBody>
       </p:sp>
     </p:spTree>
+    <p:extLst>
+      <p:ext uri="{BB962C8B-B14F-4D97-AF65-F5344CB8AC3E}">
+        <p14:creationId xmlns:p14="http://schemas.microsoft.com/office/powerpoint/2010/main" val="3750375640"/>
+      </p:ext>
+    </p:extLst>
   </p:cSld>
   <p:clrMapOvr>
     <a:masterClrMapping/>
@@ -1549,7 +1151,7 @@
               <a:rPr lang="en-US" smtClean="0"/>
               <a:t>Click to edit Master title style</a:t>
             </a:r>
-            <a:endParaRPr lang="en-US"/>
+            <a:endParaRPr lang="en-SG"/>
           </a:p>
         </p:txBody>
       </p:sp>
@@ -1634,7 +1236,7 @@
               <a:rPr lang="en-US" smtClean="0"/>
               <a:t>Fifth level</a:t>
             </a:r>
-            <a:endParaRPr lang="en-US"/>
+            <a:endParaRPr lang="en-SG"/>
           </a:p>
         </p:txBody>
       </p:sp>
@@ -1719,7 +1321,7 @@
               <a:rPr lang="en-US" smtClean="0"/>
               <a:t>Fifth level</a:t>
             </a:r>
-            <a:endParaRPr lang="en-US"/>
+            <a:endParaRPr lang="en-SG"/>
           </a:p>
         </p:txBody>
       </p:sp>
@@ -1738,7 +1340,11 @@
           <a:bodyPr/>
           <a:lstStyle/>
           <a:p>
-            <a:endParaRPr lang="en-US"/>
+            <a:fld id="{A0F86979-30DA-49EE-A740-32EBA6D2B7DE}" type="datetimeFigureOut">
+              <a:rPr lang="en-SG" smtClean="0"/>
+              <a:t>2/6/2017</a:t>
+            </a:fld>
+            <a:endParaRPr lang="en-SG"/>
           </a:p>
         </p:txBody>
       </p:sp>
@@ -1757,7 +1363,7 @@
           <a:bodyPr/>
           <a:lstStyle/>
           <a:p>
-            <a:endParaRPr lang="en-US"/>
+            <a:endParaRPr lang="en-SG"/>
           </a:p>
         </p:txBody>
       </p:sp>
@@ -1776,16 +1382,20 @@
           <a:bodyPr/>
           <a:lstStyle/>
           <a:p>
-            <a:fld id="{5B8905EB-9186-4B9B-BEF9-C6B1CD50847D}" type="slidenum">
-              <a:rPr lang="en-US" smtClean="0"/>
-              <a:pPr/>
+            <a:fld id="{EBF7C7F7-E270-4260-A412-76A75D6182AD}" type="slidenum">
+              <a:rPr lang="en-SG" smtClean="0"/>
               <a:t>‹#›</a:t>
             </a:fld>
-            <a:endParaRPr lang="en-US"/>
+            <a:endParaRPr lang="en-SG"/>
           </a:p>
         </p:txBody>
       </p:sp>
     </p:spTree>
+    <p:extLst>
+      <p:ext uri="{BB962C8B-B14F-4D97-AF65-F5344CB8AC3E}">
+        <p14:creationId xmlns:p14="http://schemas.microsoft.com/office/powerpoint/2010/main" val="168309803"/>
+      </p:ext>
+    </p:extLst>
   </p:cSld>
   <p:clrMapOvr>
     <a:masterClrMapping/>
@@ -1822,26 +1432,18 @@
         </p:nvSpPr>
         <p:spPr/>
         <p:txBody>
-          <a:bodyPr>
-            <a:normAutofit/>
-          </a:bodyPr>
+          <a:bodyPr/>
           <a:lstStyle>
-            <a:lvl1pPr algn="l">
-              <a:defRPr sz="4000">
-                <a:solidFill>
-                  <a:schemeClr val="accent6">
-                    <a:lumMod val="75000"/>
-                  </a:schemeClr>
-                </a:solidFill>
-              </a:defRPr>
+            <a:lvl1pPr>
+              <a:defRPr/>
             </a:lvl1pPr>
           </a:lstStyle>
           <a:p>
             <a:r>
-              <a:rPr lang="en-US" dirty="0" smtClean="0"/>
+              <a:rPr lang="en-US" smtClean="0"/>
               <a:t>Click to edit Master title style</a:t>
             </a:r>
-            <a:endParaRPr lang="en-US" dirty="0"/>
+            <a:endParaRPr lang="en-SG"/>
           </a:p>
         </p:txBody>
       </p:sp>
@@ -1991,7 +1593,7 @@
               <a:rPr lang="en-US" smtClean="0"/>
               <a:t>Fifth level</a:t>
             </a:r>
-            <a:endParaRPr lang="en-US"/>
+            <a:endParaRPr lang="en-SG"/>
           </a:p>
         </p:txBody>
       </p:sp>
@@ -2141,7 +1743,7 @@
               <a:rPr lang="en-US" smtClean="0"/>
               <a:t>Fifth level</a:t>
             </a:r>
-            <a:endParaRPr lang="en-US"/>
+            <a:endParaRPr lang="en-SG"/>
           </a:p>
         </p:txBody>
       </p:sp>
@@ -2160,7 +1762,11 @@
           <a:bodyPr/>
           <a:lstStyle/>
           <a:p>
-            <a:endParaRPr lang="en-US"/>
+            <a:fld id="{A0F86979-30DA-49EE-A740-32EBA6D2B7DE}" type="datetimeFigureOut">
+              <a:rPr lang="en-SG" smtClean="0"/>
+              <a:t>2/6/2017</a:t>
+            </a:fld>
+            <a:endParaRPr lang="en-SG"/>
           </a:p>
         </p:txBody>
       </p:sp>
@@ -2179,7 +1785,7 @@
           <a:bodyPr/>
           <a:lstStyle/>
           <a:p>
-            <a:endParaRPr lang="en-US"/>
+            <a:endParaRPr lang="en-SG"/>
           </a:p>
         </p:txBody>
       </p:sp>
@@ -2198,27 +1804,24 @@
           <a:bodyPr/>
           <a:lstStyle/>
           <a:p>
-            <a:fld id="{5B8905EB-9186-4B9B-BEF9-C6B1CD50847D}" type="slidenum">
-              <a:rPr lang="en-US" smtClean="0"/>
-              <a:pPr/>
+            <a:fld id="{EBF7C7F7-E270-4260-A412-76A75D6182AD}" type="slidenum">
+              <a:rPr lang="en-SG" smtClean="0"/>
               <a:t>‹#›</a:t>
             </a:fld>
-            <a:endParaRPr lang="en-US"/>
+            <a:endParaRPr lang="en-SG"/>
           </a:p>
         </p:txBody>
       </p:sp>
     </p:spTree>
+    <p:extLst>
+      <p:ext uri="{BB962C8B-B14F-4D97-AF65-F5344CB8AC3E}">
+        <p14:creationId xmlns:p14="http://schemas.microsoft.com/office/powerpoint/2010/main" val="188146314"/>
+      </p:ext>
+    </p:extLst>
   </p:cSld>
   <p:clrMapOvr>
     <a:masterClrMapping/>
   </p:clrMapOvr>
-  <p:timing>
-    <p:tnLst>
-      <p:par>
-        <p:cTn id="1" dur="indefinite" restart="never" nodeType="tmRoot"/>
-      </p:par>
-    </p:tnLst>
-  </p:timing>
 </p:sldLayout>
 </file>
 
@@ -2258,7 +1861,7 @@
               <a:rPr lang="en-US" smtClean="0"/>
               <a:t>Click to edit Master title style</a:t>
             </a:r>
-            <a:endParaRPr lang="en-US"/>
+            <a:endParaRPr lang="en-SG"/>
           </a:p>
         </p:txBody>
       </p:sp>
@@ -2277,7 +1880,11 @@
           <a:bodyPr/>
           <a:lstStyle/>
           <a:p>
-            <a:endParaRPr lang="en-US"/>
+            <a:fld id="{A0F86979-30DA-49EE-A740-32EBA6D2B7DE}" type="datetimeFigureOut">
+              <a:rPr lang="en-SG" smtClean="0"/>
+              <a:t>2/6/2017</a:t>
+            </a:fld>
+            <a:endParaRPr lang="en-SG"/>
           </a:p>
         </p:txBody>
       </p:sp>
@@ -2296,7 +1903,7 @@
           <a:bodyPr/>
           <a:lstStyle/>
           <a:p>
-            <a:endParaRPr lang="en-US"/>
+            <a:endParaRPr lang="en-SG"/>
           </a:p>
         </p:txBody>
       </p:sp>
@@ -2315,16 +1922,20 @@
           <a:bodyPr/>
           <a:lstStyle/>
           <a:p>
-            <a:fld id="{5B8905EB-9186-4B9B-BEF9-C6B1CD50847D}" type="slidenum">
-              <a:rPr lang="en-US" smtClean="0"/>
-              <a:pPr/>
+            <a:fld id="{EBF7C7F7-E270-4260-A412-76A75D6182AD}" type="slidenum">
+              <a:rPr lang="en-SG" smtClean="0"/>
               <a:t>‹#›</a:t>
             </a:fld>
-            <a:endParaRPr lang="en-US"/>
+            <a:endParaRPr lang="en-SG"/>
           </a:p>
         </p:txBody>
       </p:sp>
     </p:spTree>
+    <p:extLst>
+      <p:ext uri="{BB962C8B-B14F-4D97-AF65-F5344CB8AC3E}">
+        <p14:creationId xmlns:p14="http://schemas.microsoft.com/office/powerpoint/2010/main" val="3909473291"/>
+      </p:ext>
+    </p:extLst>
   </p:cSld>
   <p:clrMapOvr>
     <a:masterClrMapping/>
@@ -2364,7 +1975,11 @@
           <a:bodyPr/>
           <a:lstStyle/>
           <a:p>
-            <a:endParaRPr lang="en-US"/>
+            <a:fld id="{A0F86979-30DA-49EE-A740-32EBA6D2B7DE}" type="datetimeFigureOut">
+              <a:rPr lang="en-SG" smtClean="0"/>
+              <a:t>2/6/2017</a:t>
+            </a:fld>
+            <a:endParaRPr lang="en-SG"/>
           </a:p>
         </p:txBody>
       </p:sp>
@@ -2383,7 +1998,7 @@
           <a:bodyPr/>
           <a:lstStyle/>
           <a:p>
-            <a:endParaRPr lang="en-US"/>
+            <a:endParaRPr lang="en-SG"/>
           </a:p>
         </p:txBody>
       </p:sp>
@@ -2402,16 +2017,20 @@
           <a:bodyPr/>
           <a:lstStyle/>
           <a:p>
-            <a:fld id="{5B8905EB-9186-4B9B-BEF9-C6B1CD50847D}" type="slidenum">
-              <a:rPr lang="en-US" smtClean="0"/>
-              <a:pPr/>
+            <a:fld id="{EBF7C7F7-E270-4260-A412-76A75D6182AD}" type="slidenum">
+              <a:rPr lang="en-SG" smtClean="0"/>
               <a:t>‹#›</a:t>
             </a:fld>
-            <a:endParaRPr lang="en-US"/>
+            <a:endParaRPr lang="en-SG"/>
           </a:p>
         </p:txBody>
       </p:sp>
     </p:spTree>
+    <p:extLst>
+      <p:ext uri="{BB962C8B-B14F-4D97-AF65-F5344CB8AC3E}">
+        <p14:creationId xmlns:p14="http://schemas.microsoft.com/office/powerpoint/2010/main" val="3259271892"/>
+      </p:ext>
+    </p:extLst>
   </p:cSld>
   <p:clrMapOvr>
     <a:masterClrMapping/>
@@ -2464,7 +2083,7 @@
               <a:rPr lang="en-US" smtClean="0"/>
               <a:t>Click to edit Master title style</a:t>
             </a:r>
-            <a:endParaRPr lang="en-US"/>
+            <a:endParaRPr lang="en-SG"/>
           </a:p>
         </p:txBody>
       </p:sp>
@@ -2549,7 +2168,7 @@
               <a:rPr lang="en-US" smtClean="0"/>
               <a:t>Fifth level</a:t>
             </a:r>
-            <a:endParaRPr lang="en-US"/>
+            <a:endParaRPr lang="en-SG"/>
           </a:p>
         </p:txBody>
       </p:sp>
@@ -2633,7 +2252,11 @@
           <a:bodyPr/>
           <a:lstStyle/>
           <a:p>
-            <a:endParaRPr lang="en-US"/>
+            <a:fld id="{A0F86979-30DA-49EE-A740-32EBA6D2B7DE}" type="datetimeFigureOut">
+              <a:rPr lang="en-SG" smtClean="0"/>
+              <a:t>2/6/2017</a:t>
+            </a:fld>
+            <a:endParaRPr lang="en-SG"/>
           </a:p>
         </p:txBody>
       </p:sp>
@@ -2652,7 +2275,7 @@
           <a:bodyPr/>
           <a:lstStyle/>
           <a:p>
-            <a:endParaRPr lang="en-US"/>
+            <a:endParaRPr lang="en-SG"/>
           </a:p>
         </p:txBody>
       </p:sp>
@@ -2671,16 +2294,20 @@
           <a:bodyPr/>
           <a:lstStyle/>
           <a:p>
-            <a:fld id="{5B8905EB-9186-4B9B-BEF9-C6B1CD50847D}" type="slidenum">
-              <a:rPr lang="en-US" smtClean="0"/>
-              <a:pPr/>
+            <a:fld id="{EBF7C7F7-E270-4260-A412-76A75D6182AD}" type="slidenum">
+              <a:rPr lang="en-SG" smtClean="0"/>
               <a:t>‹#›</a:t>
             </a:fld>
-            <a:endParaRPr lang="en-US"/>
+            <a:endParaRPr lang="en-SG"/>
           </a:p>
         </p:txBody>
       </p:sp>
     </p:spTree>
+    <p:extLst>
+      <p:ext uri="{BB962C8B-B14F-4D97-AF65-F5344CB8AC3E}">
+        <p14:creationId xmlns:p14="http://schemas.microsoft.com/office/powerpoint/2010/main" val="2859859922"/>
+      </p:ext>
+    </p:extLst>
   </p:cSld>
   <p:clrMapOvr>
     <a:masterClrMapping/>
@@ -2733,7 +2360,7 @@
               <a:rPr lang="en-US" smtClean="0"/>
               <a:t>Click to edit Master title style</a:t>
             </a:r>
-            <a:endParaRPr lang="en-US"/>
+            <a:endParaRPr lang="en-SG"/>
           </a:p>
         </p:txBody>
       </p:sp>
@@ -2794,7 +2421,7 @@
             </a:lvl9pPr>
           </a:lstStyle>
           <a:p>
-            <a:endParaRPr lang="en-US"/>
+            <a:endParaRPr lang="en-SG"/>
           </a:p>
         </p:txBody>
       </p:sp>
@@ -2878,7 +2505,11 @@
           <a:bodyPr/>
           <a:lstStyle/>
           <a:p>
-            <a:endParaRPr lang="en-US"/>
+            <a:fld id="{A0F86979-30DA-49EE-A740-32EBA6D2B7DE}" type="datetimeFigureOut">
+              <a:rPr lang="en-SG" smtClean="0"/>
+              <a:t>2/6/2017</a:t>
+            </a:fld>
+            <a:endParaRPr lang="en-SG"/>
           </a:p>
         </p:txBody>
       </p:sp>
@@ -2897,7 +2528,7 @@
           <a:bodyPr/>
           <a:lstStyle/>
           <a:p>
-            <a:endParaRPr lang="en-US"/>
+            <a:endParaRPr lang="en-SG"/>
           </a:p>
         </p:txBody>
       </p:sp>
@@ -2916,16 +2547,20 @@
           <a:bodyPr/>
           <a:lstStyle/>
           <a:p>
-            <a:fld id="{5B8905EB-9186-4B9B-BEF9-C6B1CD50847D}" type="slidenum">
-              <a:rPr lang="en-US" smtClean="0"/>
-              <a:pPr/>
+            <a:fld id="{EBF7C7F7-E270-4260-A412-76A75D6182AD}" type="slidenum">
+              <a:rPr lang="en-SG" smtClean="0"/>
               <a:t>‹#›</a:t>
             </a:fld>
-            <a:endParaRPr lang="en-US"/>
+            <a:endParaRPr lang="en-SG"/>
           </a:p>
         </p:txBody>
       </p:sp>
     </p:spTree>
+    <p:extLst>
+      <p:ext uri="{BB962C8B-B14F-4D97-AF65-F5344CB8AC3E}">
+        <p14:creationId xmlns:p14="http://schemas.microsoft.com/office/powerpoint/2010/main" val="1672414452"/>
+      </p:ext>
+    </p:extLst>
   </p:cSld>
   <p:clrMapOvr>
     <a:masterClrMapping/>
@@ -2984,7 +2619,7 @@
               <a:rPr lang="en-US" smtClean="0"/>
               <a:t>Click to edit Master title style</a:t>
             </a:r>
-            <a:endParaRPr lang="en-US"/>
+            <a:endParaRPr lang="en-SG"/>
           </a:p>
         </p:txBody>
       </p:sp>
@@ -3046,7 +2681,7 @@
               <a:rPr lang="en-US" smtClean="0"/>
               <a:t>Fifth level</a:t>
             </a:r>
-            <a:endParaRPr lang="en-US"/>
+            <a:endParaRPr lang="en-SG"/>
           </a:p>
         </p:txBody>
       </p:sp>
@@ -3083,7 +2718,11 @@
             </a:lvl1pPr>
           </a:lstStyle>
           <a:p>
-            <a:endParaRPr lang="en-US"/>
+            <a:fld id="{A0F86979-30DA-49EE-A740-32EBA6D2B7DE}" type="datetimeFigureOut">
+              <a:rPr lang="en-SG" smtClean="0"/>
+              <a:t>2/6/2017</a:t>
+            </a:fld>
+            <a:endParaRPr lang="en-SG"/>
           </a:p>
         </p:txBody>
       </p:sp>
@@ -3120,7 +2759,7 @@
             </a:lvl1pPr>
           </a:lstStyle>
           <a:p>
-            <a:endParaRPr lang="en-US"/>
+            <a:endParaRPr lang="en-SG"/>
           </a:p>
         </p:txBody>
       </p:sp>
@@ -3157,16 +2796,20 @@
             </a:lvl1pPr>
           </a:lstStyle>
           <a:p>
-            <a:fld id="{5B8905EB-9186-4B9B-BEF9-C6B1CD50847D}" type="slidenum">
-              <a:rPr lang="en-US" smtClean="0"/>
-              <a:pPr/>
+            <a:fld id="{EBF7C7F7-E270-4260-A412-76A75D6182AD}" type="slidenum">
+              <a:rPr lang="en-SG" smtClean="0"/>
               <a:t>‹#›</a:t>
             </a:fld>
-            <a:endParaRPr lang="en-US"/>
+            <a:endParaRPr lang="en-SG"/>
           </a:p>
         </p:txBody>
       </p:sp>
     </p:spTree>
+    <p:extLst>
+      <p:ext uri="{BB962C8B-B14F-4D97-AF65-F5344CB8AC3E}">
+        <p14:creationId xmlns:p14="http://schemas.microsoft.com/office/powerpoint/2010/main" val="1974023683"/>
+      </p:ext>
+    </p:extLst>
   </p:cSld>
   <p:clrMap bg1="lt1" tx1="dk1" bg2="lt2" tx2="dk2" accent1="accent1" accent2="accent2" accent3="accent3" accent4="accent4" accent5="accent5" accent6="accent6" hlink="hlink" folHlink="folHlink"/>
   <p:sldLayoutIdLst>
@@ -3182,7 +2825,6 @@
     <p:sldLayoutId id="2147483658" r:id="rId10"/>
     <p:sldLayoutId id="2147483659" r:id="rId11"/>
   </p:sldLayoutIdLst>
-  <p:hf hdr="0" ftr="0" dt="0"/>
   <p:txStyles>
     <p:titleStyle>
       <a:lvl1pPr algn="ctr" defTabSz="914400" rtl="0" eaLnBrk="1" latinLnBrk="0" hangingPunct="1">
@@ -3205,7 +2847,7 @@
         <a:spcBef>
           <a:spcPct val="20000"/>
         </a:spcBef>
-        <a:buFont typeface="Arial" pitchFamily="34" charset="0"/>
+        <a:buFont typeface="Arial" panose="020B0604020202020204" pitchFamily="34" charset="0"/>
         <a:buChar char="•"/>
         <a:defRPr sz="3200" kern="1200">
           <a:solidFill>
@@ -3220,7 +2862,7 @@
         <a:spcBef>
           <a:spcPct val="20000"/>
         </a:spcBef>
-        <a:buFont typeface="Arial" pitchFamily="34" charset="0"/>
+        <a:buFont typeface="Arial" panose="020B0604020202020204" pitchFamily="34" charset="0"/>
         <a:buChar char="–"/>
         <a:defRPr sz="2800" kern="1200">
           <a:solidFill>
@@ -3235,7 +2877,7 @@
         <a:spcBef>
           <a:spcPct val="20000"/>
         </a:spcBef>
-        <a:buFont typeface="Arial" pitchFamily="34" charset="0"/>
+        <a:buFont typeface="Arial" panose="020B0604020202020204" pitchFamily="34" charset="0"/>
         <a:buChar char="•"/>
         <a:defRPr sz="2400" kern="1200">
           <a:solidFill>
@@ -3250,7 +2892,7 @@
         <a:spcBef>
           <a:spcPct val="20000"/>
         </a:spcBef>
-        <a:buFont typeface="Arial" pitchFamily="34" charset="0"/>
+        <a:buFont typeface="Arial" panose="020B0604020202020204" pitchFamily="34" charset="0"/>
         <a:buChar char="–"/>
         <a:defRPr sz="2000" kern="1200">
           <a:solidFill>
@@ -3265,7 +2907,7 @@
         <a:spcBef>
           <a:spcPct val="20000"/>
         </a:spcBef>
-        <a:buFont typeface="Arial" pitchFamily="34" charset="0"/>
+        <a:buFont typeface="Arial" panose="020B0604020202020204" pitchFamily="34" charset="0"/>
         <a:buChar char="»"/>
         <a:defRPr sz="2000" kern="1200">
           <a:solidFill>
@@ -3280,7 +2922,7 @@
         <a:spcBef>
           <a:spcPct val="20000"/>
         </a:spcBef>
-        <a:buFont typeface="Arial" pitchFamily="34" charset="0"/>
+        <a:buFont typeface="Arial" panose="020B0604020202020204" pitchFamily="34" charset="0"/>
         <a:buChar char="•"/>
         <a:defRPr sz="2000" kern="1200">
           <a:solidFill>
@@ -3295,7 +2937,7 @@
         <a:spcBef>
           <a:spcPct val="20000"/>
         </a:spcBef>
-        <a:buFont typeface="Arial" pitchFamily="34" charset="0"/>
+        <a:buFont typeface="Arial" panose="020B0604020202020204" pitchFamily="34" charset="0"/>
         <a:buChar char="•"/>
         <a:defRPr sz="2000" kern="1200">
           <a:solidFill>
@@ -3310,7 +2952,7 @@
         <a:spcBef>
           <a:spcPct val="20000"/>
         </a:spcBef>
-        <a:buFont typeface="Arial" pitchFamily="34" charset="0"/>
+        <a:buFont typeface="Arial" panose="020B0604020202020204" pitchFamily="34" charset="0"/>
         <a:buChar char="•"/>
         <a:defRPr sz="2000" kern="1200">
           <a:solidFill>
@@ -3325,7 +2967,7 @@
         <a:spcBef>
           <a:spcPct val="20000"/>
         </a:spcBef>
-        <a:buFont typeface="Arial" pitchFamily="34" charset="0"/>
+        <a:buFont typeface="Arial" panose="020B0604020202020204" pitchFamily="34" charset="0"/>
         <a:buChar char="•"/>
         <a:defRPr sz="2000" kern="1200">
           <a:solidFill>
@@ -3455,7 +3097,7 @@
       </p:grpSpPr>
       <p:sp>
         <p:nvSpPr>
-          <p:cNvPr id="5" name="Content Placeholder 2"/>
+          <p:cNvPr id="289" name="Content Placeholder 2"/>
           <p:cNvSpPr txBox="1">
             <a:spLocks/>
           </p:cNvSpPr>
@@ -4558,7 +4200,7 @@
       </p:sp>
       <p:sp>
         <p:nvSpPr>
-          <p:cNvPr id="6" name="Content Placeholder 6"/>
+          <p:cNvPr id="290" name="Content Placeholder 6"/>
           <p:cNvSpPr txBox="1">
             <a:spLocks/>
           </p:cNvSpPr>
@@ -5677,7 +5319,7 @@
       </p:sp>
       <p:sp>
         <p:nvSpPr>
-          <p:cNvPr id="7" name="Rectangle 1"/>
+          <p:cNvPr id="291" name="Rectangle 1"/>
           <p:cNvSpPr>
             <a:spLocks noChangeArrowheads="1"/>
           </p:cNvSpPr>
@@ -5792,7 +5434,7 @@
       </p:sp>
       <p:cxnSp>
         <p:nvCxnSpPr>
-          <p:cNvPr id="8" name="Straight Connector 7"/>
+          <p:cNvPr id="292" name="Straight Connector 291"/>
           <p:cNvCxnSpPr/>
           <p:nvPr/>
         </p:nvCxnSpPr>
@@ -5821,6 +5463,11 @@
         </p:style>
       </p:cxnSp>
     </p:spTree>
+    <p:extLst>
+      <p:ext uri="{BB962C8B-B14F-4D97-AF65-F5344CB8AC3E}">
+        <p14:creationId xmlns:p14="http://schemas.microsoft.com/office/powerpoint/2010/main" val="26466125"/>
+      </p:ext>
+    </p:extLst>
   </p:cSld>
   <p:clrMapOvr>
     <a:masterClrMapping/>
@@ -5910,6 +5557,7 @@
         <a:font script="Mong" typeface="Mongolian Baiti"/>
         <a:font script="Viet" typeface="Times New Roman"/>
         <a:font script="Uigh" typeface="Microsoft Uighur"/>
+        <a:font script="Geor" typeface="Sylfaen"/>
       </a:majorFont>
       <a:minorFont>
         <a:latin typeface="Calibri"/>
@@ -5944,289 +5592,7 @@
         <a:font script="Mong" typeface="Mongolian Baiti"/>
         <a:font script="Viet" typeface="Arial"/>
         <a:font script="Uigh" typeface="Microsoft Uighur"/>
-      </a:minorFont>
-    </a:fontScheme>
-    <a:fmtScheme name="Office">
-      <a:fillStyleLst>
-        <a:solidFill>
-          <a:schemeClr val="phClr"/>
-        </a:solidFill>
-        <a:gradFill rotWithShape="1">
-          <a:gsLst>
-            <a:gs pos="0">
-              <a:schemeClr val="phClr">
-                <a:tint val="50000"/>
-                <a:satMod val="300000"/>
-              </a:schemeClr>
-            </a:gs>
-            <a:gs pos="35000">
-              <a:schemeClr val="phClr">
-                <a:tint val="37000"/>
-                <a:satMod val="300000"/>
-              </a:schemeClr>
-            </a:gs>
-            <a:gs pos="100000">
-              <a:schemeClr val="phClr">
-                <a:tint val="15000"/>
-                <a:satMod val="350000"/>
-              </a:schemeClr>
-            </a:gs>
-          </a:gsLst>
-          <a:lin ang="16200000" scaled="1"/>
-        </a:gradFill>
-        <a:gradFill rotWithShape="1">
-          <a:gsLst>
-            <a:gs pos="0">
-              <a:schemeClr val="phClr">
-                <a:shade val="51000"/>
-                <a:satMod val="130000"/>
-              </a:schemeClr>
-            </a:gs>
-            <a:gs pos="80000">
-              <a:schemeClr val="phClr">
-                <a:shade val="93000"/>
-                <a:satMod val="130000"/>
-              </a:schemeClr>
-            </a:gs>
-            <a:gs pos="100000">
-              <a:schemeClr val="phClr">
-                <a:shade val="94000"/>
-                <a:satMod val="135000"/>
-              </a:schemeClr>
-            </a:gs>
-          </a:gsLst>
-          <a:lin ang="16200000" scaled="0"/>
-        </a:gradFill>
-      </a:fillStyleLst>
-      <a:lnStyleLst>
-        <a:ln w="9525" cap="flat" cmpd="sng" algn="ctr">
-          <a:solidFill>
-            <a:schemeClr val="phClr">
-              <a:shade val="95000"/>
-              <a:satMod val="105000"/>
-            </a:schemeClr>
-          </a:solidFill>
-          <a:prstDash val="solid"/>
-        </a:ln>
-        <a:ln w="25400" cap="flat" cmpd="sng" algn="ctr">
-          <a:solidFill>
-            <a:schemeClr val="phClr"/>
-          </a:solidFill>
-          <a:prstDash val="solid"/>
-        </a:ln>
-        <a:ln w="38100" cap="flat" cmpd="sng" algn="ctr">
-          <a:solidFill>
-            <a:schemeClr val="phClr"/>
-          </a:solidFill>
-          <a:prstDash val="solid"/>
-        </a:ln>
-      </a:lnStyleLst>
-      <a:effectStyleLst>
-        <a:effectStyle>
-          <a:effectLst>
-            <a:outerShdw blurRad="40000" dist="20000" dir="5400000" rotWithShape="0">
-              <a:srgbClr val="000000">
-                <a:alpha val="38000"/>
-              </a:srgbClr>
-            </a:outerShdw>
-          </a:effectLst>
-        </a:effectStyle>
-        <a:effectStyle>
-          <a:effectLst>
-            <a:outerShdw blurRad="40000" dist="23000" dir="5400000" rotWithShape="0">
-              <a:srgbClr val="000000">
-                <a:alpha val="35000"/>
-              </a:srgbClr>
-            </a:outerShdw>
-          </a:effectLst>
-        </a:effectStyle>
-        <a:effectStyle>
-          <a:effectLst>
-            <a:outerShdw blurRad="40000" dist="23000" dir="5400000" rotWithShape="0">
-              <a:srgbClr val="000000">
-                <a:alpha val="35000"/>
-              </a:srgbClr>
-            </a:outerShdw>
-          </a:effectLst>
-          <a:scene3d>
-            <a:camera prst="orthographicFront">
-              <a:rot lat="0" lon="0" rev="0"/>
-            </a:camera>
-            <a:lightRig rig="threePt" dir="t">
-              <a:rot lat="0" lon="0" rev="1200000"/>
-            </a:lightRig>
-          </a:scene3d>
-          <a:sp3d>
-            <a:bevelT w="63500" h="25400"/>
-          </a:sp3d>
-        </a:effectStyle>
-      </a:effectStyleLst>
-      <a:bgFillStyleLst>
-        <a:solidFill>
-          <a:schemeClr val="phClr"/>
-        </a:solidFill>
-        <a:gradFill rotWithShape="1">
-          <a:gsLst>
-            <a:gs pos="0">
-              <a:schemeClr val="phClr">
-                <a:tint val="40000"/>
-                <a:satMod val="350000"/>
-              </a:schemeClr>
-            </a:gs>
-            <a:gs pos="40000">
-              <a:schemeClr val="phClr">
-                <a:tint val="45000"/>
-                <a:shade val="99000"/>
-                <a:satMod val="350000"/>
-              </a:schemeClr>
-            </a:gs>
-            <a:gs pos="100000">
-              <a:schemeClr val="phClr">
-                <a:shade val="20000"/>
-                <a:satMod val="255000"/>
-              </a:schemeClr>
-            </a:gs>
-          </a:gsLst>
-          <a:path path="circle">
-            <a:fillToRect l="50000" t="-80000" r="50000" b="180000"/>
-          </a:path>
-        </a:gradFill>
-        <a:gradFill rotWithShape="1">
-          <a:gsLst>
-            <a:gs pos="0">
-              <a:schemeClr val="phClr">
-                <a:tint val="80000"/>
-                <a:satMod val="300000"/>
-              </a:schemeClr>
-            </a:gs>
-            <a:gs pos="100000">
-              <a:schemeClr val="phClr">
-                <a:shade val="30000"/>
-                <a:satMod val="200000"/>
-              </a:schemeClr>
-            </a:gs>
-          </a:gsLst>
-          <a:path path="circle">
-            <a:fillToRect l="50000" t="50000" r="50000" b="50000"/>
-          </a:path>
-        </a:gradFill>
-      </a:bgFillStyleLst>
-    </a:fmtScheme>
-  </a:themeElements>
-  <a:objectDefaults/>
-  <a:extraClrSchemeLst/>
-</a:theme>
-</file>
-
-<file path=ppt/theme/theme2.xml><?xml version="1.0" encoding="utf-8"?>
-<a:theme xmlns:a="http://schemas.openxmlformats.org/drawingml/2006/main" name="Office Theme">
-  <a:themeElements>
-    <a:clrScheme name="Office">
-      <a:dk1>
-        <a:sysClr val="windowText" lastClr="000000"/>
-      </a:dk1>
-      <a:lt1>
-        <a:sysClr val="window" lastClr="FFFFFF"/>
-      </a:lt1>
-      <a:dk2>
-        <a:srgbClr val="1F497D"/>
-      </a:dk2>
-      <a:lt2>
-        <a:srgbClr val="EEECE1"/>
-      </a:lt2>
-      <a:accent1>
-        <a:srgbClr val="4F81BD"/>
-      </a:accent1>
-      <a:accent2>
-        <a:srgbClr val="C0504D"/>
-      </a:accent2>
-      <a:accent3>
-        <a:srgbClr val="9BBB59"/>
-      </a:accent3>
-      <a:accent4>
-        <a:srgbClr val="8064A2"/>
-      </a:accent4>
-      <a:accent5>
-        <a:srgbClr val="4BACC6"/>
-      </a:accent5>
-      <a:accent6>
-        <a:srgbClr val="F79646"/>
-      </a:accent6>
-      <a:hlink>
-        <a:srgbClr val="0000FF"/>
-      </a:hlink>
-      <a:folHlink>
-        <a:srgbClr val="800080"/>
-      </a:folHlink>
-    </a:clrScheme>
-    <a:fontScheme name="Office">
-      <a:majorFont>
-        <a:latin typeface="Calibri"/>
-        <a:ea typeface=""/>
-        <a:cs typeface=""/>
-        <a:font script="Jpan" typeface="ＭＳ Ｐゴシック"/>
-        <a:font script="Hang" typeface="맑은 고딕"/>
-        <a:font script="Hans" typeface="宋体"/>
-        <a:font script="Hant" typeface="新細明體"/>
-        <a:font script="Arab" typeface="Times New Roman"/>
-        <a:font script="Hebr" typeface="Times New Roman"/>
-        <a:font script="Thai" typeface="Angsana New"/>
-        <a:font script="Ethi" typeface="Nyala"/>
-        <a:font script="Beng" typeface="Vrinda"/>
-        <a:font script="Gujr" typeface="Shruti"/>
-        <a:font script="Khmr" typeface="MoolBoran"/>
-        <a:font script="Knda" typeface="Tunga"/>
-        <a:font script="Guru" typeface="Raavi"/>
-        <a:font script="Cans" typeface="Euphemia"/>
-        <a:font script="Cher" typeface="Plantagenet Cherokee"/>
-        <a:font script="Yiii" typeface="Microsoft Yi Baiti"/>
-        <a:font script="Tibt" typeface="Microsoft Himalaya"/>
-        <a:font script="Thaa" typeface="MV Boli"/>
-        <a:font script="Deva" typeface="Mangal"/>
-        <a:font script="Telu" typeface="Gautami"/>
-        <a:font script="Taml" typeface="Latha"/>
-        <a:font script="Syrc" typeface="Estrangelo Edessa"/>
-        <a:font script="Orya" typeface="Kalinga"/>
-        <a:font script="Mlym" typeface="Kartika"/>
-        <a:font script="Laoo" typeface="DokChampa"/>
-        <a:font script="Sinh" typeface="Iskoola Pota"/>
-        <a:font script="Mong" typeface="Mongolian Baiti"/>
-        <a:font script="Viet" typeface="Times New Roman"/>
-        <a:font script="Uigh" typeface="Microsoft Uighur"/>
-      </a:majorFont>
-      <a:minorFont>
-        <a:latin typeface="Calibri"/>
-        <a:ea typeface=""/>
-        <a:cs typeface=""/>
-        <a:font script="Jpan" typeface="ＭＳ Ｐゴシック"/>
-        <a:font script="Hang" typeface="맑은 고딕"/>
-        <a:font script="Hans" typeface="宋体"/>
-        <a:font script="Hant" typeface="新細明體"/>
-        <a:font script="Arab" typeface="Arial"/>
-        <a:font script="Hebr" typeface="Arial"/>
-        <a:font script="Thai" typeface="Cordia New"/>
-        <a:font script="Ethi" typeface="Nyala"/>
-        <a:font script="Beng" typeface="Vrinda"/>
-        <a:font script="Gujr" typeface="Shruti"/>
-        <a:font script="Khmr" typeface="DaunPenh"/>
-        <a:font script="Knda" typeface="Tunga"/>
-        <a:font script="Guru" typeface="Raavi"/>
-        <a:font script="Cans" typeface="Euphemia"/>
-        <a:font script="Cher" typeface="Plantagenet Cherokee"/>
-        <a:font script="Yiii" typeface="Microsoft Yi Baiti"/>
-        <a:font script="Tibt" typeface="Microsoft Himalaya"/>
-        <a:font script="Thaa" typeface="MV Boli"/>
-        <a:font script="Deva" typeface="Mangal"/>
-        <a:font script="Telu" typeface="Gautami"/>
-        <a:font script="Taml" typeface="Latha"/>
-        <a:font script="Syrc" typeface="Estrangelo Edessa"/>
-        <a:font script="Orya" typeface="Kalinga"/>
-        <a:font script="Mlym" typeface="Kartika"/>
-        <a:font script="Laoo" typeface="DokChampa"/>
-        <a:font script="Sinh" typeface="Iskoola Pota"/>
-        <a:font script="Mong" typeface="Mongolian Baiti"/>
-        <a:font script="Viet" typeface="Arial"/>
-        <a:font script="Uigh" typeface="Microsoft Uighur"/>
+        <a:font script="Geor" typeface="Sylfaen"/>
       </a:minorFont>
     </a:fontScheme>
     <a:fmtScheme name="Office">

</xml_diff>

<commit_message>
Add UML sequence diagrams content (#3)
</commit_message>
<xml_diff>
--- a/diagrams/requirements/prototyping/textPrototypeCLI.pptx
+++ b/diagrams/requirements/prototyping/textPrototypeCLI.pptx
@@ -1,17 +1,14 @@
 
 <file path=ppt/presentation.xml><?xml version="1.0" encoding="utf-8"?>
-<p:presentation xmlns:a="http://schemas.openxmlformats.org/drawingml/2006/main" xmlns:r="http://schemas.openxmlformats.org/officeDocument/2006/relationships" xmlns:p="http://schemas.openxmlformats.org/presentationml/2006/main" firstSlideNum="46" showSpecialPlsOnTitleSld="0">
+<p:presentation xmlns:a="http://schemas.openxmlformats.org/drawingml/2006/main" xmlns:r="http://schemas.openxmlformats.org/officeDocument/2006/relationships" xmlns:p="http://schemas.openxmlformats.org/presentationml/2006/main" saveSubsetFonts="1">
   <p:sldMasterIdLst>
     <p:sldMasterId id="2147483648" r:id="rId1"/>
   </p:sldMasterIdLst>
-  <p:notesMasterIdLst>
-    <p:notesMasterId r:id="rId3"/>
-  </p:notesMasterIdLst>
   <p:sldIdLst>
-    <p:sldId id="498" r:id="rId2"/>
+    <p:sldId id="256" r:id="rId2"/>
   </p:sldIdLst>
   <p:sldSz cx="9144000" cy="6858000" type="screen4x3"/>
-  <p:notesSz cx="7099300" cy="10234613"/>
+  <p:notesSz cx="6858000" cy="9144000"/>
   <p:defaultTextStyle>
     <a:defPPr>
       <a:defRPr lang="en-US"/>
@@ -110,440 +107,6 @@
 </p:presentation>
 </file>
 
-<file path=ppt/notesMasters/notesMaster1.xml><?xml version="1.0" encoding="utf-8"?>
-<p:notesMaster xmlns:a="http://schemas.openxmlformats.org/drawingml/2006/main" xmlns:r="http://schemas.openxmlformats.org/officeDocument/2006/relationships" xmlns:p="http://schemas.openxmlformats.org/presentationml/2006/main">
-  <p:cSld>
-    <p:bg>
-      <p:bgRef idx="1001">
-        <a:schemeClr val="bg1"/>
-      </p:bgRef>
-    </p:bg>
-    <p:spTree>
-      <p:nvGrpSpPr>
-        <p:cNvPr id="1" name=""/>
-        <p:cNvGrpSpPr/>
-        <p:nvPr/>
-      </p:nvGrpSpPr>
-      <p:grpSpPr>
-        <a:xfrm>
-          <a:off x="0" y="0"/>
-          <a:ext cx="0" cy="0"/>
-          <a:chOff x="0" y="0"/>
-          <a:chExt cx="0" cy="0"/>
-        </a:xfrm>
-      </p:grpSpPr>
-      <p:sp>
-        <p:nvSpPr>
-          <p:cNvPr id="2" name="Header Placeholder 1"/>
-          <p:cNvSpPr>
-            <a:spLocks noGrp="1"/>
-          </p:cNvSpPr>
-          <p:nvPr>
-            <p:ph type="hdr" sz="quarter"/>
-          </p:nvPr>
-        </p:nvSpPr>
-        <p:spPr>
-          <a:xfrm>
-            <a:off x="0" y="0"/>
-            <a:ext cx="3076575" cy="511175"/>
-          </a:xfrm>
-          <a:prstGeom prst="rect">
-            <a:avLst/>
-          </a:prstGeom>
-        </p:spPr>
-        <p:txBody>
-          <a:bodyPr vert="horz" lIns="91440" tIns="45720" rIns="91440" bIns="45720" rtlCol="0"/>
-          <a:lstStyle>
-            <a:lvl1pPr algn="l">
-              <a:defRPr sz="1200"/>
-            </a:lvl1pPr>
-          </a:lstStyle>
-          <a:p>
-            <a:endParaRPr lang="en-US"/>
-          </a:p>
-        </p:txBody>
-      </p:sp>
-      <p:sp>
-        <p:nvSpPr>
-          <p:cNvPr id="3" name="Date Placeholder 2"/>
-          <p:cNvSpPr>
-            <a:spLocks noGrp="1"/>
-          </p:cNvSpPr>
-          <p:nvPr>
-            <p:ph type="dt" idx="1"/>
-          </p:nvPr>
-        </p:nvSpPr>
-        <p:spPr>
-          <a:xfrm>
-            <a:off x="4021138" y="0"/>
-            <a:ext cx="3076575" cy="511175"/>
-          </a:xfrm>
-          <a:prstGeom prst="rect">
-            <a:avLst/>
-          </a:prstGeom>
-        </p:spPr>
-        <p:txBody>
-          <a:bodyPr vert="horz" lIns="91440" tIns="45720" rIns="91440" bIns="45720" rtlCol="0"/>
-          <a:lstStyle>
-            <a:lvl1pPr algn="r">
-              <a:defRPr sz="1200"/>
-            </a:lvl1pPr>
-          </a:lstStyle>
-          <a:p>
-            <a:fld id="{C4CB16A5-0670-4B7E-8131-AB3DA198B062}" type="datetimeFigureOut">
-              <a:rPr lang="en-US" smtClean="0"/>
-              <a:t>5/16/2017</a:t>
-            </a:fld>
-            <a:endParaRPr lang="en-US"/>
-          </a:p>
-        </p:txBody>
-      </p:sp>
-      <p:sp>
-        <p:nvSpPr>
-          <p:cNvPr id="4" name="Slide Image Placeholder 3"/>
-          <p:cNvSpPr>
-            <a:spLocks noGrp="1" noRot="1" noChangeAspect="1"/>
-          </p:cNvSpPr>
-          <p:nvPr>
-            <p:ph type="sldImg" idx="2"/>
-          </p:nvPr>
-        </p:nvSpPr>
-        <p:spPr>
-          <a:xfrm>
-            <a:off x="992188" y="768350"/>
-            <a:ext cx="5114925" cy="3836988"/>
-          </a:xfrm>
-          <a:prstGeom prst="rect">
-            <a:avLst/>
-          </a:prstGeom>
-          <a:noFill/>
-          <a:ln w="12700">
-            <a:solidFill>
-              <a:prstClr val="black"/>
-            </a:solidFill>
-          </a:ln>
-        </p:spPr>
-        <p:txBody>
-          <a:bodyPr vert="horz" lIns="91440" tIns="45720" rIns="91440" bIns="45720" rtlCol="0" anchor="ctr"/>
-          <a:lstStyle/>
-          <a:p>
-            <a:endParaRPr lang="en-US"/>
-          </a:p>
-        </p:txBody>
-      </p:sp>
-      <p:sp>
-        <p:nvSpPr>
-          <p:cNvPr id="5" name="Notes Placeholder 4"/>
-          <p:cNvSpPr>
-            <a:spLocks noGrp="1"/>
-          </p:cNvSpPr>
-          <p:nvPr>
-            <p:ph type="body" sz="quarter" idx="3"/>
-          </p:nvPr>
-        </p:nvSpPr>
-        <p:spPr>
-          <a:xfrm>
-            <a:off x="709613" y="4860925"/>
-            <a:ext cx="5680075" cy="4605338"/>
-          </a:xfrm>
-          <a:prstGeom prst="rect">
-            <a:avLst/>
-          </a:prstGeom>
-        </p:spPr>
-        <p:txBody>
-          <a:bodyPr vert="horz" lIns="91440" tIns="45720" rIns="91440" bIns="45720" rtlCol="0">
-            <a:normAutofit/>
-          </a:bodyPr>
-          <a:lstStyle/>
-          <a:p>
-            <a:pPr lvl="0"/>
-            <a:r>
-              <a:rPr lang="en-US" smtClean="0"/>
-              <a:t>Click to edit Master text styles</a:t>
-            </a:r>
-          </a:p>
-          <a:p>
-            <a:pPr lvl="1"/>
-            <a:r>
-              <a:rPr lang="en-US" smtClean="0"/>
-              <a:t>Second level</a:t>
-            </a:r>
-          </a:p>
-          <a:p>
-            <a:pPr lvl="2"/>
-            <a:r>
-              <a:rPr lang="en-US" smtClean="0"/>
-              <a:t>Third level</a:t>
-            </a:r>
-          </a:p>
-          <a:p>
-            <a:pPr lvl="3"/>
-            <a:r>
-              <a:rPr lang="en-US" smtClean="0"/>
-              <a:t>Fourth level</a:t>
-            </a:r>
-          </a:p>
-          <a:p>
-            <a:pPr lvl="4"/>
-            <a:r>
-              <a:rPr lang="en-US" smtClean="0"/>
-              <a:t>Fifth level</a:t>
-            </a:r>
-            <a:endParaRPr lang="en-US"/>
-          </a:p>
-        </p:txBody>
-      </p:sp>
-      <p:sp>
-        <p:nvSpPr>
-          <p:cNvPr id="6" name="Footer Placeholder 5"/>
-          <p:cNvSpPr>
-            <a:spLocks noGrp="1"/>
-          </p:cNvSpPr>
-          <p:nvPr>
-            <p:ph type="ftr" sz="quarter" idx="4"/>
-          </p:nvPr>
-        </p:nvSpPr>
-        <p:spPr>
-          <a:xfrm>
-            <a:off x="0" y="9721850"/>
-            <a:ext cx="3076575" cy="511175"/>
-          </a:xfrm>
-          <a:prstGeom prst="rect">
-            <a:avLst/>
-          </a:prstGeom>
-        </p:spPr>
-        <p:txBody>
-          <a:bodyPr vert="horz" lIns="91440" tIns="45720" rIns="91440" bIns="45720" rtlCol="0" anchor="b"/>
-          <a:lstStyle>
-            <a:lvl1pPr algn="l">
-              <a:defRPr sz="1200"/>
-            </a:lvl1pPr>
-          </a:lstStyle>
-          <a:p>
-            <a:endParaRPr lang="en-US"/>
-          </a:p>
-        </p:txBody>
-      </p:sp>
-      <p:sp>
-        <p:nvSpPr>
-          <p:cNvPr id="7" name="Slide Number Placeholder 6"/>
-          <p:cNvSpPr>
-            <a:spLocks noGrp="1"/>
-          </p:cNvSpPr>
-          <p:nvPr>
-            <p:ph type="sldNum" sz="quarter" idx="5"/>
-          </p:nvPr>
-        </p:nvSpPr>
-        <p:spPr>
-          <a:xfrm>
-            <a:off x="4021138" y="9721850"/>
-            <a:ext cx="3076575" cy="511175"/>
-          </a:xfrm>
-          <a:prstGeom prst="rect">
-            <a:avLst/>
-          </a:prstGeom>
-        </p:spPr>
-        <p:txBody>
-          <a:bodyPr vert="horz" lIns="91440" tIns="45720" rIns="91440" bIns="45720" rtlCol="0" anchor="b"/>
-          <a:lstStyle>
-            <a:lvl1pPr algn="r">
-              <a:defRPr sz="1200"/>
-            </a:lvl1pPr>
-          </a:lstStyle>
-          <a:p>
-            <a:fld id="{2359FD0C-6A23-41D2-9051-83CC13FCA920}" type="slidenum">
-              <a:rPr lang="en-US" smtClean="0"/>
-              <a:t>‹#›</a:t>
-            </a:fld>
-            <a:endParaRPr lang="en-US"/>
-          </a:p>
-        </p:txBody>
-      </p:sp>
-    </p:spTree>
-    <p:extLst>
-      <p:ext uri="{BB962C8B-B14F-4D97-AF65-F5344CB8AC3E}">
-        <p14:creationId xmlns:p14="http://schemas.microsoft.com/office/powerpoint/2010/main" val="117883665"/>
-      </p:ext>
-    </p:extLst>
-  </p:cSld>
-  <p:clrMap bg1="lt1" tx1="dk1" bg2="lt2" tx2="dk2" accent1="accent1" accent2="accent2" accent3="accent3" accent4="accent4" accent5="accent5" accent6="accent6" hlink="hlink" folHlink="folHlink"/>
-  <p:notesStyle>
-    <a:lvl1pPr marL="0" algn="l" defTabSz="914400" rtl="0" eaLnBrk="1" latinLnBrk="0" hangingPunct="1">
-      <a:defRPr sz="1200" kern="1200">
-        <a:solidFill>
-          <a:schemeClr val="tx1"/>
-        </a:solidFill>
-        <a:latin typeface="+mn-lt"/>
-        <a:ea typeface="+mn-ea"/>
-        <a:cs typeface="+mn-cs"/>
-      </a:defRPr>
-    </a:lvl1pPr>
-    <a:lvl2pPr marL="457200" algn="l" defTabSz="914400" rtl="0" eaLnBrk="1" latinLnBrk="0" hangingPunct="1">
-      <a:defRPr sz="1200" kern="1200">
-        <a:solidFill>
-          <a:schemeClr val="tx1"/>
-        </a:solidFill>
-        <a:latin typeface="+mn-lt"/>
-        <a:ea typeface="+mn-ea"/>
-        <a:cs typeface="+mn-cs"/>
-      </a:defRPr>
-    </a:lvl2pPr>
-    <a:lvl3pPr marL="914400" algn="l" defTabSz="914400" rtl="0" eaLnBrk="1" latinLnBrk="0" hangingPunct="1">
-      <a:defRPr sz="1200" kern="1200">
-        <a:solidFill>
-          <a:schemeClr val="tx1"/>
-        </a:solidFill>
-        <a:latin typeface="+mn-lt"/>
-        <a:ea typeface="+mn-ea"/>
-        <a:cs typeface="+mn-cs"/>
-      </a:defRPr>
-    </a:lvl3pPr>
-    <a:lvl4pPr marL="1371600" algn="l" defTabSz="914400" rtl="0" eaLnBrk="1" latinLnBrk="0" hangingPunct="1">
-      <a:defRPr sz="1200" kern="1200">
-        <a:solidFill>
-          <a:schemeClr val="tx1"/>
-        </a:solidFill>
-        <a:latin typeface="+mn-lt"/>
-        <a:ea typeface="+mn-ea"/>
-        <a:cs typeface="+mn-cs"/>
-      </a:defRPr>
-    </a:lvl4pPr>
-    <a:lvl5pPr marL="1828800" algn="l" defTabSz="914400" rtl="0" eaLnBrk="1" latinLnBrk="0" hangingPunct="1">
-      <a:defRPr sz="1200" kern="1200">
-        <a:solidFill>
-          <a:schemeClr val="tx1"/>
-        </a:solidFill>
-        <a:latin typeface="+mn-lt"/>
-        <a:ea typeface="+mn-ea"/>
-        <a:cs typeface="+mn-cs"/>
-      </a:defRPr>
-    </a:lvl5pPr>
-    <a:lvl6pPr marL="2286000" algn="l" defTabSz="914400" rtl="0" eaLnBrk="1" latinLnBrk="0" hangingPunct="1">
-      <a:defRPr sz="1200" kern="1200">
-        <a:solidFill>
-          <a:schemeClr val="tx1"/>
-        </a:solidFill>
-        <a:latin typeface="+mn-lt"/>
-        <a:ea typeface="+mn-ea"/>
-        <a:cs typeface="+mn-cs"/>
-      </a:defRPr>
-    </a:lvl6pPr>
-    <a:lvl7pPr marL="2743200" algn="l" defTabSz="914400" rtl="0" eaLnBrk="1" latinLnBrk="0" hangingPunct="1">
-      <a:defRPr sz="1200" kern="1200">
-        <a:solidFill>
-          <a:schemeClr val="tx1"/>
-        </a:solidFill>
-        <a:latin typeface="+mn-lt"/>
-        <a:ea typeface="+mn-ea"/>
-        <a:cs typeface="+mn-cs"/>
-      </a:defRPr>
-    </a:lvl7pPr>
-    <a:lvl8pPr marL="3200400" algn="l" defTabSz="914400" rtl="0" eaLnBrk="1" latinLnBrk="0" hangingPunct="1">
-      <a:defRPr sz="1200" kern="1200">
-        <a:solidFill>
-          <a:schemeClr val="tx1"/>
-        </a:solidFill>
-        <a:latin typeface="+mn-lt"/>
-        <a:ea typeface="+mn-ea"/>
-        <a:cs typeface="+mn-cs"/>
-      </a:defRPr>
-    </a:lvl8pPr>
-    <a:lvl9pPr marL="3657600" algn="l" defTabSz="914400" rtl="0" eaLnBrk="1" latinLnBrk="0" hangingPunct="1">
-      <a:defRPr sz="1200" kern="1200">
-        <a:solidFill>
-          <a:schemeClr val="tx1"/>
-        </a:solidFill>
-        <a:latin typeface="+mn-lt"/>
-        <a:ea typeface="+mn-ea"/>
-        <a:cs typeface="+mn-cs"/>
-      </a:defRPr>
-    </a:lvl9pPr>
-  </p:notesStyle>
-</p:notesMaster>
-</file>
-
-<file path=ppt/notesSlides/notesSlide1.xml><?xml version="1.0" encoding="utf-8"?>
-<p:notes xmlns:a="http://schemas.openxmlformats.org/drawingml/2006/main" xmlns:r="http://schemas.openxmlformats.org/officeDocument/2006/relationships" xmlns:p="http://schemas.openxmlformats.org/presentationml/2006/main">
-  <p:cSld>
-    <p:spTree>
-      <p:nvGrpSpPr>
-        <p:cNvPr id="1" name=""/>
-        <p:cNvGrpSpPr/>
-        <p:nvPr/>
-      </p:nvGrpSpPr>
-      <p:grpSpPr>
-        <a:xfrm>
-          <a:off x="0" y="0"/>
-          <a:ext cx="0" cy="0"/>
-          <a:chOff x="0" y="0"/>
-          <a:chExt cx="0" cy="0"/>
-        </a:xfrm>
-      </p:grpSpPr>
-      <p:sp>
-        <p:nvSpPr>
-          <p:cNvPr id="2" name="Slide Image Placeholder 1"/>
-          <p:cNvSpPr>
-            <a:spLocks noGrp="1" noRot="1" noChangeAspect="1"/>
-          </p:cNvSpPr>
-          <p:nvPr>
-            <p:ph type="sldImg"/>
-          </p:nvPr>
-        </p:nvSpPr>
-        <p:spPr/>
-      </p:sp>
-      <p:sp>
-        <p:nvSpPr>
-          <p:cNvPr id="3" name="Notes Placeholder 2"/>
-          <p:cNvSpPr>
-            <a:spLocks noGrp="1"/>
-          </p:cNvSpPr>
-          <p:nvPr>
-            <p:ph type="body" idx="1"/>
-          </p:nvPr>
-        </p:nvSpPr>
-        <p:spPr/>
-        <p:txBody>
-          <a:bodyPr>
-            <a:normAutofit/>
-          </a:bodyPr>
-          <a:lstStyle/>
-          <a:p>
-            <a:endParaRPr lang="en-US"/>
-          </a:p>
-        </p:txBody>
-      </p:sp>
-      <p:sp>
-        <p:nvSpPr>
-          <p:cNvPr id="4" name="Slide Number Placeholder 3"/>
-          <p:cNvSpPr>
-            <a:spLocks noGrp="1"/>
-          </p:cNvSpPr>
-          <p:nvPr>
-            <p:ph type="sldNum" sz="quarter" idx="10"/>
-          </p:nvPr>
-        </p:nvSpPr>
-        <p:spPr/>
-        <p:txBody>
-          <a:bodyPr/>
-          <a:lstStyle/>
-          <a:p>
-            <a:fld id="{D8AAB797-2628-476A-9ECD-6773D97C2656}" type="slidenum">
-              <a:rPr lang="en-US" smtClean="0"/>
-              <a:pPr/>
-              <a:t>46</a:t>
-            </a:fld>
-            <a:endParaRPr lang="en-US"/>
-          </a:p>
-        </p:txBody>
-      </p:sp>
-    </p:spTree>
-  </p:cSld>
-  <p:clrMapOvr>
-    <a:masterClrMapping/>
-  </p:clrMapOvr>
-</p:notes>
-</file>
-
 <file path=ppt/slideLayouts/slideLayout1.xml><?xml version="1.0" encoding="utf-8"?>
 <p:sldLayout xmlns:a="http://schemas.openxmlformats.org/drawingml/2006/main" xmlns:r="http://schemas.openxmlformats.org/officeDocument/2006/relationships" xmlns:p="http://schemas.openxmlformats.org/presentationml/2006/main" type="title" preserve="1">
   <p:cSld name="Title Slide">
@@ -585,7 +148,7 @@
               <a:rPr lang="en-US" smtClean="0"/>
               <a:t>Click to edit Master title style</a:t>
             </a:r>
-            <a:endParaRPr lang="en-US"/>
+            <a:endParaRPr lang="en-SG"/>
           </a:p>
         </p:txBody>
       </p:sp>
@@ -704,7 +267,7 @@
               <a:rPr lang="en-US" smtClean="0"/>
               <a:t>Click to edit Master subtitle style</a:t>
             </a:r>
-            <a:endParaRPr lang="en-US"/>
+            <a:endParaRPr lang="en-SG"/>
           </a:p>
         </p:txBody>
       </p:sp>
@@ -723,7 +286,11 @@
           <a:bodyPr/>
           <a:lstStyle/>
           <a:p>
-            <a:endParaRPr lang="en-US"/>
+            <a:fld id="{A0F86979-30DA-49EE-A740-32EBA6D2B7DE}" type="datetimeFigureOut">
+              <a:rPr lang="en-SG" smtClean="0"/>
+              <a:t>2/6/2017</a:t>
+            </a:fld>
+            <a:endParaRPr lang="en-SG"/>
           </a:p>
         </p:txBody>
       </p:sp>
@@ -742,7 +309,7 @@
           <a:bodyPr/>
           <a:lstStyle/>
           <a:p>
-            <a:endParaRPr lang="en-US"/>
+            <a:endParaRPr lang="en-SG"/>
           </a:p>
         </p:txBody>
       </p:sp>
@@ -761,16 +328,20 @@
           <a:bodyPr/>
           <a:lstStyle/>
           <a:p>
-            <a:fld id="{5B8905EB-9186-4B9B-BEF9-C6B1CD50847D}" type="slidenum">
-              <a:rPr lang="en-US" smtClean="0"/>
-              <a:pPr/>
+            <a:fld id="{EBF7C7F7-E270-4260-A412-76A75D6182AD}" type="slidenum">
+              <a:rPr lang="en-SG" smtClean="0"/>
               <a:t>‹#›</a:t>
             </a:fld>
-            <a:endParaRPr lang="en-US"/>
+            <a:endParaRPr lang="en-SG"/>
           </a:p>
         </p:txBody>
       </p:sp>
     </p:spTree>
+    <p:extLst>
+      <p:ext uri="{BB962C8B-B14F-4D97-AF65-F5344CB8AC3E}">
+        <p14:creationId xmlns:p14="http://schemas.microsoft.com/office/powerpoint/2010/main" val="135796274"/>
+      </p:ext>
+    </p:extLst>
   </p:cSld>
   <p:clrMapOvr>
     <a:masterClrMapping/>
@@ -814,7 +385,7 @@
               <a:rPr lang="en-US" smtClean="0"/>
               <a:t>Click to edit Master title style</a:t>
             </a:r>
-            <a:endParaRPr lang="en-US"/>
+            <a:endParaRPr lang="en-SG"/>
           </a:p>
         </p:txBody>
       </p:sp>
@@ -866,7 +437,7 @@
               <a:rPr lang="en-US" smtClean="0"/>
               <a:t>Fifth level</a:t>
             </a:r>
-            <a:endParaRPr lang="en-US"/>
+            <a:endParaRPr lang="en-SG"/>
           </a:p>
         </p:txBody>
       </p:sp>
@@ -885,7 +456,11 @@
           <a:bodyPr/>
           <a:lstStyle/>
           <a:p>
-            <a:endParaRPr lang="en-US"/>
+            <a:fld id="{A0F86979-30DA-49EE-A740-32EBA6D2B7DE}" type="datetimeFigureOut">
+              <a:rPr lang="en-SG" smtClean="0"/>
+              <a:t>2/6/2017</a:t>
+            </a:fld>
+            <a:endParaRPr lang="en-SG"/>
           </a:p>
         </p:txBody>
       </p:sp>
@@ -904,7 +479,7 @@
           <a:bodyPr/>
           <a:lstStyle/>
           <a:p>
-            <a:endParaRPr lang="en-US"/>
+            <a:endParaRPr lang="en-SG"/>
           </a:p>
         </p:txBody>
       </p:sp>
@@ -923,16 +498,20 @@
           <a:bodyPr/>
           <a:lstStyle/>
           <a:p>
-            <a:fld id="{5B8905EB-9186-4B9B-BEF9-C6B1CD50847D}" type="slidenum">
-              <a:rPr lang="en-US" smtClean="0"/>
-              <a:pPr/>
+            <a:fld id="{EBF7C7F7-E270-4260-A412-76A75D6182AD}" type="slidenum">
+              <a:rPr lang="en-SG" smtClean="0"/>
               <a:t>‹#›</a:t>
             </a:fld>
-            <a:endParaRPr lang="en-US"/>
+            <a:endParaRPr lang="en-SG"/>
           </a:p>
         </p:txBody>
       </p:sp>
     </p:spTree>
+    <p:extLst>
+      <p:ext uri="{BB962C8B-B14F-4D97-AF65-F5344CB8AC3E}">
+        <p14:creationId xmlns:p14="http://schemas.microsoft.com/office/powerpoint/2010/main" val="3528568514"/>
+      </p:ext>
+    </p:extLst>
   </p:cSld>
   <p:clrMapOvr>
     <a:masterClrMapping/>
@@ -981,7 +560,7 @@
               <a:rPr lang="en-US" smtClean="0"/>
               <a:t>Click to edit Master title style</a:t>
             </a:r>
-            <a:endParaRPr lang="en-US"/>
+            <a:endParaRPr lang="en-SG"/>
           </a:p>
         </p:txBody>
       </p:sp>
@@ -1038,7 +617,7 @@
               <a:rPr lang="en-US" smtClean="0"/>
               <a:t>Fifth level</a:t>
             </a:r>
-            <a:endParaRPr lang="en-US"/>
+            <a:endParaRPr lang="en-SG"/>
           </a:p>
         </p:txBody>
       </p:sp>
@@ -1057,7 +636,11 @@
           <a:bodyPr/>
           <a:lstStyle/>
           <a:p>
-            <a:endParaRPr lang="en-US"/>
+            <a:fld id="{A0F86979-30DA-49EE-A740-32EBA6D2B7DE}" type="datetimeFigureOut">
+              <a:rPr lang="en-SG" smtClean="0"/>
+              <a:t>2/6/2017</a:t>
+            </a:fld>
+            <a:endParaRPr lang="en-SG"/>
           </a:p>
         </p:txBody>
       </p:sp>
@@ -1076,7 +659,7 @@
           <a:bodyPr/>
           <a:lstStyle/>
           <a:p>
-            <a:endParaRPr lang="en-US"/>
+            <a:endParaRPr lang="en-SG"/>
           </a:p>
         </p:txBody>
       </p:sp>
@@ -1095,16 +678,20 @@
           <a:bodyPr/>
           <a:lstStyle/>
           <a:p>
-            <a:fld id="{5B8905EB-9186-4B9B-BEF9-C6B1CD50847D}" type="slidenum">
-              <a:rPr lang="en-US" smtClean="0"/>
-              <a:pPr/>
+            <a:fld id="{EBF7C7F7-E270-4260-A412-76A75D6182AD}" type="slidenum">
+              <a:rPr lang="en-SG" smtClean="0"/>
               <a:t>‹#›</a:t>
             </a:fld>
-            <a:endParaRPr lang="en-US"/>
+            <a:endParaRPr lang="en-SG"/>
           </a:p>
         </p:txBody>
       </p:sp>
     </p:spTree>
+    <p:extLst>
+      <p:ext uri="{BB962C8B-B14F-4D97-AF65-F5344CB8AC3E}">
+        <p14:creationId xmlns:p14="http://schemas.microsoft.com/office/powerpoint/2010/main" val="2418564099"/>
+      </p:ext>
+    </p:extLst>
   </p:cSld>
   <p:clrMapOvr>
     <a:masterClrMapping/>
@@ -1139,33 +726,16 @@
             <p:ph type="title"/>
           </p:nvPr>
         </p:nvSpPr>
-        <p:spPr>
-          <a:xfrm>
-            <a:off x="457200" y="274638"/>
-            <a:ext cx="8229600" cy="792162"/>
-          </a:xfrm>
-        </p:spPr>
-        <p:txBody>
-          <a:bodyPr>
-            <a:normAutofit/>
-          </a:bodyPr>
-          <a:lstStyle>
-            <a:lvl1pPr algn="l">
-              <a:defRPr sz="3600">
-                <a:solidFill>
-                  <a:schemeClr val="accent6">
-                    <a:lumMod val="75000"/>
-                  </a:schemeClr>
-                </a:solidFill>
-              </a:defRPr>
-            </a:lvl1pPr>
-          </a:lstStyle>
-          <a:p>
-            <a:r>
-              <a:rPr lang="en-US" dirty="0" smtClean="0"/>
+        <p:spPr/>
+        <p:txBody>
+          <a:bodyPr/>
+          <a:lstStyle/>
+          <a:p>
+            <a:r>
+              <a:rPr lang="en-US" smtClean="0"/>
               <a:t>Click to edit Master title style</a:t>
             </a:r>
-            <a:endParaRPr lang="en-US" dirty="0"/>
+            <a:endParaRPr lang="en-SG"/>
           </a:p>
         </p:txBody>
       </p:sp>
@@ -1179,99 +749,123 @@
             <p:ph idx="1"/>
           </p:nvPr>
         </p:nvSpPr>
-        <p:spPr>
-          <a:xfrm>
-            <a:off x="457200" y="1219200"/>
-            <a:ext cx="8229600" cy="1754326"/>
-          </a:xfrm>
-        </p:spPr>
-        <p:txBody>
-          <a:bodyPr>
-            <a:spAutoFit/>
-          </a:bodyPr>
-          <a:lstStyle>
-            <a:lvl1pPr>
-              <a:buSzPct val="50000"/>
-              <a:buFont typeface="Wingdings" pitchFamily="2" charset="2"/>
-              <a:buChar char="q"/>
-              <a:defRPr sz="2200">
-                <a:latin typeface="Cambria" pitchFamily="18" charset="0"/>
-              </a:defRPr>
-            </a:lvl1pPr>
-            <a:lvl2pPr>
-              <a:buSzPct val="75000"/>
-              <a:buFont typeface="Courier New" pitchFamily="49" charset="0"/>
-              <a:buChar char="o"/>
-              <a:defRPr sz="2000">
-                <a:latin typeface="Cambria" pitchFamily="18" charset="0"/>
-              </a:defRPr>
-            </a:lvl2pPr>
-            <a:lvl3pPr>
-              <a:defRPr sz="1800">
-                <a:latin typeface="Cambria" pitchFamily="18" charset="0"/>
-              </a:defRPr>
-            </a:lvl3pPr>
-            <a:lvl4pPr>
-              <a:defRPr sz="1600">
-                <a:latin typeface="Cambria" pitchFamily="18" charset="0"/>
-              </a:defRPr>
-            </a:lvl4pPr>
-            <a:lvl5pPr>
-              <a:defRPr sz="1600">
-                <a:latin typeface="Cambria" pitchFamily="18" charset="0"/>
-              </a:defRPr>
-            </a:lvl5pPr>
-          </a:lstStyle>
+        <p:spPr/>
+        <p:txBody>
+          <a:bodyPr/>
+          <a:lstStyle/>
           <a:p>
             <a:pPr lvl="0"/>
             <a:r>
-              <a:rPr lang="en-US" dirty="0" smtClean="0"/>
+              <a:rPr lang="en-US" smtClean="0"/>
               <a:t>Click to edit Master text styles</a:t>
             </a:r>
           </a:p>
           <a:p>
             <a:pPr lvl="1"/>
             <a:r>
-              <a:rPr lang="en-US" dirty="0" smtClean="0"/>
+              <a:rPr lang="en-US" smtClean="0"/>
               <a:t>Second level</a:t>
             </a:r>
           </a:p>
           <a:p>
             <a:pPr lvl="2"/>
             <a:r>
-              <a:rPr lang="en-US" dirty="0" smtClean="0"/>
+              <a:rPr lang="en-US" smtClean="0"/>
               <a:t>Third level</a:t>
             </a:r>
           </a:p>
           <a:p>
             <a:pPr lvl="3"/>
             <a:r>
-              <a:rPr lang="en-US" dirty="0" smtClean="0"/>
+              <a:rPr lang="en-US" smtClean="0"/>
               <a:t>Fourth level</a:t>
             </a:r>
           </a:p>
           <a:p>
             <a:pPr lvl="4"/>
             <a:r>
-              <a:rPr lang="en-US" dirty="0" smtClean="0"/>
+              <a:rPr lang="en-US" smtClean="0"/>
               <a:t>Fifth level</a:t>
             </a:r>
-            <a:endParaRPr lang="en-US" dirty="0"/>
+            <a:endParaRPr lang="en-SG"/>
+          </a:p>
+        </p:txBody>
+      </p:sp>
+      <p:sp>
+        <p:nvSpPr>
+          <p:cNvPr id="4" name="Date Placeholder 3"/>
+          <p:cNvSpPr>
+            <a:spLocks noGrp="1"/>
+          </p:cNvSpPr>
+          <p:nvPr>
+            <p:ph type="dt" sz="half" idx="10"/>
+          </p:nvPr>
+        </p:nvSpPr>
+        <p:spPr/>
+        <p:txBody>
+          <a:bodyPr/>
+          <a:lstStyle/>
+          <a:p>
+            <a:fld id="{A0F86979-30DA-49EE-A740-32EBA6D2B7DE}" type="datetimeFigureOut">
+              <a:rPr lang="en-SG" smtClean="0"/>
+              <a:t>2/6/2017</a:t>
+            </a:fld>
+            <a:endParaRPr lang="en-SG"/>
+          </a:p>
+        </p:txBody>
+      </p:sp>
+      <p:sp>
+        <p:nvSpPr>
+          <p:cNvPr id="5" name="Footer Placeholder 4"/>
+          <p:cNvSpPr>
+            <a:spLocks noGrp="1"/>
+          </p:cNvSpPr>
+          <p:nvPr>
+            <p:ph type="ftr" sz="quarter" idx="11"/>
+          </p:nvPr>
+        </p:nvSpPr>
+        <p:spPr/>
+        <p:txBody>
+          <a:bodyPr/>
+          <a:lstStyle/>
+          <a:p>
+            <a:endParaRPr lang="en-SG"/>
+          </a:p>
+        </p:txBody>
+      </p:sp>
+      <p:sp>
+        <p:nvSpPr>
+          <p:cNvPr id="6" name="Slide Number Placeholder 5"/>
+          <p:cNvSpPr>
+            <a:spLocks noGrp="1"/>
+          </p:cNvSpPr>
+          <p:nvPr>
+            <p:ph type="sldNum" sz="quarter" idx="12"/>
+          </p:nvPr>
+        </p:nvSpPr>
+        <p:spPr/>
+        <p:txBody>
+          <a:bodyPr/>
+          <a:lstStyle/>
+          <a:p>
+            <a:fld id="{EBF7C7F7-E270-4260-A412-76A75D6182AD}" type="slidenum">
+              <a:rPr lang="en-SG" smtClean="0"/>
+              <a:t>‹#›</a:t>
+            </a:fld>
+            <a:endParaRPr lang="en-SG"/>
           </a:p>
         </p:txBody>
       </p:sp>
     </p:spTree>
+    <p:extLst>
+      <p:ext uri="{BB962C8B-B14F-4D97-AF65-F5344CB8AC3E}">
+        <p14:creationId xmlns:p14="http://schemas.microsoft.com/office/powerpoint/2010/main" val="4201411315"/>
+      </p:ext>
+    </p:extLst>
   </p:cSld>
   <p:clrMapOvr>
     <a:masterClrMapping/>
   </p:clrMapOvr>
-  <p:timing>
-    <p:tnLst>
-      <p:par>
-        <p:cTn id="1" dur="indefinite" restart="never" nodeType="tmRoot"/>
-      </p:par>
-    </p:tnLst>
-  </p:timing>
 </p:sldLayout>
 </file>
 
@@ -1320,7 +914,7 @@
               <a:rPr lang="en-US" smtClean="0"/>
               <a:t>Click to edit Master title style</a:t>
             </a:r>
-            <a:endParaRPr lang="en-US"/>
+            <a:endParaRPr lang="en-SG"/>
           </a:p>
         </p:txBody>
       </p:sp>
@@ -1458,7 +1052,11 @@
           <a:bodyPr/>
           <a:lstStyle/>
           <a:p>
-            <a:endParaRPr lang="en-US"/>
+            <a:fld id="{A0F86979-30DA-49EE-A740-32EBA6D2B7DE}" type="datetimeFigureOut">
+              <a:rPr lang="en-SG" smtClean="0"/>
+              <a:t>2/6/2017</a:t>
+            </a:fld>
+            <a:endParaRPr lang="en-SG"/>
           </a:p>
         </p:txBody>
       </p:sp>
@@ -1477,7 +1075,7 @@
           <a:bodyPr/>
           <a:lstStyle/>
           <a:p>
-            <a:endParaRPr lang="en-US"/>
+            <a:endParaRPr lang="en-SG"/>
           </a:p>
         </p:txBody>
       </p:sp>
@@ -1496,16 +1094,20 @@
           <a:bodyPr/>
           <a:lstStyle/>
           <a:p>
-            <a:fld id="{5B8905EB-9186-4B9B-BEF9-C6B1CD50847D}" type="slidenum">
-              <a:rPr lang="en-US" smtClean="0"/>
-              <a:pPr/>
+            <a:fld id="{EBF7C7F7-E270-4260-A412-76A75D6182AD}" type="slidenum">
+              <a:rPr lang="en-SG" smtClean="0"/>
               <a:t>‹#›</a:t>
             </a:fld>
-            <a:endParaRPr lang="en-US"/>
+            <a:endParaRPr lang="en-SG"/>
           </a:p>
         </p:txBody>
       </p:sp>
     </p:spTree>
+    <p:extLst>
+      <p:ext uri="{BB962C8B-B14F-4D97-AF65-F5344CB8AC3E}">
+        <p14:creationId xmlns:p14="http://schemas.microsoft.com/office/powerpoint/2010/main" val="3750375640"/>
+      </p:ext>
+    </p:extLst>
   </p:cSld>
   <p:clrMapOvr>
     <a:masterClrMapping/>
@@ -1549,7 +1151,7 @@
               <a:rPr lang="en-US" smtClean="0"/>
               <a:t>Click to edit Master title style</a:t>
             </a:r>
-            <a:endParaRPr lang="en-US"/>
+            <a:endParaRPr lang="en-SG"/>
           </a:p>
         </p:txBody>
       </p:sp>
@@ -1634,7 +1236,7 @@
               <a:rPr lang="en-US" smtClean="0"/>
               <a:t>Fifth level</a:t>
             </a:r>
-            <a:endParaRPr lang="en-US"/>
+            <a:endParaRPr lang="en-SG"/>
           </a:p>
         </p:txBody>
       </p:sp>
@@ -1719,7 +1321,7 @@
               <a:rPr lang="en-US" smtClean="0"/>
               <a:t>Fifth level</a:t>
             </a:r>
-            <a:endParaRPr lang="en-US"/>
+            <a:endParaRPr lang="en-SG"/>
           </a:p>
         </p:txBody>
       </p:sp>
@@ -1738,7 +1340,11 @@
           <a:bodyPr/>
           <a:lstStyle/>
           <a:p>
-            <a:endParaRPr lang="en-US"/>
+            <a:fld id="{A0F86979-30DA-49EE-A740-32EBA6D2B7DE}" type="datetimeFigureOut">
+              <a:rPr lang="en-SG" smtClean="0"/>
+              <a:t>2/6/2017</a:t>
+            </a:fld>
+            <a:endParaRPr lang="en-SG"/>
           </a:p>
         </p:txBody>
       </p:sp>
@@ -1757,7 +1363,7 @@
           <a:bodyPr/>
           <a:lstStyle/>
           <a:p>
-            <a:endParaRPr lang="en-US"/>
+            <a:endParaRPr lang="en-SG"/>
           </a:p>
         </p:txBody>
       </p:sp>
@@ -1776,16 +1382,20 @@
           <a:bodyPr/>
           <a:lstStyle/>
           <a:p>
-            <a:fld id="{5B8905EB-9186-4B9B-BEF9-C6B1CD50847D}" type="slidenum">
-              <a:rPr lang="en-US" smtClean="0"/>
-              <a:pPr/>
+            <a:fld id="{EBF7C7F7-E270-4260-A412-76A75D6182AD}" type="slidenum">
+              <a:rPr lang="en-SG" smtClean="0"/>
               <a:t>‹#›</a:t>
             </a:fld>
-            <a:endParaRPr lang="en-US"/>
+            <a:endParaRPr lang="en-SG"/>
           </a:p>
         </p:txBody>
       </p:sp>
     </p:spTree>
+    <p:extLst>
+      <p:ext uri="{BB962C8B-B14F-4D97-AF65-F5344CB8AC3E}">
+        <p14:creationId xmlns:p14="http://schemas.microsoft.com/office/powerpoint/2010/main" val="168309803"/>
+      </p:ext>
+    </p:extLst>
   </p:cSld>
   <p:clrMapOvr>
     <a:masterClrMapping/>
@@ -1822,26 +1432,18 @@
         </p:nvSpPr>
         <p:spPr/>
         <p:txBody>
-          <a:bodyPr>
-            <a:normAutofit/>
-          </a:bodyPr>
+          <a:bodyPr/>
           <a:lstStyle>
-            <a:lvl1pPr algn="l">
-              <a:defRPr sz="4000">
-                <a:solidFill>
-                  <a:schemeClr val="accent6">
-                    <a:lumMod val="75000"/>
-                  </a:schemeClr>
-                </a:solidFill>
-              </a:defRPr>
+            <a:lvl1pPr>
+              <a:defRPr/>
             </a:lvl1pPr>
           </a:lstStyle>
           <a:p>
             <a:r>
-              <a:rPr lang="en-US" dirty="0" smtClean="0"/>
+              <a:rPr lang="en-US" smtClean="0"/>
               <a:t>Click to edit Master title style</a:t>
             </a:r>
-            <a:endParaRPr lang="en-US" dirty="0"/>
+            <a:endParaRPr lang="en-SG"/>
           </a:p>
         </p:txBody>
       </p:sp>
@@ -1991,7 +1593,7 @@
               <a:rPr lang="en-US" smtClean="0"/>
               <a:t>Fifth level</a:t>
             </a:r>
-            <a:endParaRPr lang="en-US"/>
+            <a:endParaRPr lang="en-SG"/>
           </a:p>
         </p:txBody>
       </p:sp>
@@ -2141,7 +1743,7 @@
               <a:rPr lang="en-US" smtClean="0"/>
               <a:t>Fifth level</a:t>
             </a:r>
-            <a:endParaRPr lang="en-US"/>
+            <a:endParaRPr lang="en-SG"/>
           </a:p>
         </p:txBody>
       </p:sp>
@@ -2160,7 +1762,11 @@
           <a:bodyPr/>
           <a:lstStyle/>
           <a:p>
-            <a:endParaRPr lang="en-US"/>
+            <a:fld id="{A0F86979-30DA-49EE-A740-32EBA6D2B7DE}" type="datetimeFigureOut">
+              <a:rPr lang="en-SG" smtClean="0"/>
+              <a:t>2/6/2017</a:t>
+            </a:fld>
+            <a:endParaRPr lang="en-SG"/>
           </a:p>
         </p:txBody>
       </p:sp>
@@ -2179,7 +1785,7 @@
           <a:bodyPr/>
           <a:lstStyle/>
           <a:p>
-            <a:endParaRPr lang="en-US"/>
+            <a:endParaRPr lang="en-SG"/>
           </a:p>
         </p:txBody>
       </p:sp>
@@ -2198,27 +1804,24 @@
           <a:bodyPr/>
           <a:lstStyle/>
           <a:p>
-            <a:fld id="{5B8905EB-9186-4B9B-BEF9-C6B1CD50847D}" type="slidenum">
-              <a:rPr lang="en-US" smtClean="0"/>
-              <a:pPr/>
+            <a:fld id="{EBF7C7F7-E270-4260-A412-76A75D6182AD}" type="slidenum">
+              <a:rPr lang="en-SG" smtClean="0"/>
               <a:t>‹#›</a:t>
             </a:fld>
-            <a:endParaRPr lang="en-US"/>
+            <a:endParaRPr lang="en-SG"/>
           </a:p>
         </p:txBody>
       </p:sp>
     </p:spTree>
+    <p:extLst>
+      <p:ext uri="{BB962C8B-B14F-4D97-AF65-F5344CB8AC3E}">
+        <p14:creationId xmlns:p14="http://schemas.microsoft.com/office/powerpoint/2010/main" val="188146314"/>
+      </p:ext>
+    </p:extLst>
   </p:cSld>
   <p:clrMapOvr>
     <a:masterClrMapping/>
   </p:clrMapOvr>
-  <p:timing>
-    <p:tnLst>
-      <p:par>
-        <p:cTn id="1" dur="indefinite" restart="never" nodeType="tmRoot"/>
-      </p:par>
-    </p:tnLst>
-  </p:timing>
 </p:sldLayout>
 </file>
 
@@ -2258,7 +1861,7 @@
               <a:rPr lang="en-US" smtClean="0"/>
               <a:t>Click to edit Master title style</a:t>
             </a:r>
-            <a:endParaRPr lang="en-US"/>
+            <a:endParaRPr lang="en-SG"/>
           </a:p>
         </p:txBody>
       </p:sp>
@@ -2277,7 +1880,11 @@
           <a:bodyPr/>
           <a:lstStyle/>
           <a:p>
-            <a:endParaRPr lang="en-US"/>
+            <a:fld id="{A0F86979-30DA-49EE-A740-32EBA6D2B7DE}" type="datetimeFigureOut">
+              <a:rPr lang="en-SG" smtClean="0"/>
+              <a:t>2/6/2017</a:t>
+            </a:fld>
+            <a:endParaRPr lang="en-SG"/>
           </a:p>
         </p:txBody>
       </p:sp>
@@ -2296,7 +1903,7 @@
           <a:bodyPr/>
           <a:lstStyle/>
           <a:p>
-            <a:endParaRPr lang="en-US"/>
+            <a:endParaRPr lang="en-SG"/>
           </a:p>
         </p:txBody>
       </p:sp>
@@ -2315,16 +1922,20 @@
           <a:bodyPr/>
           <a:lstStyle/>
           <a:p>
-            <a:fld id="{5B8905EB-9186-4B9B-BEF9-C6B1CD50847D}" type="slidenum">
-              <a:rPr lang="en-US" smtClean="0"/>
-              <a:pPr/>
+            <a:fld id="{EBF7C7F7-E270-4260-A412-76A75D6182AD}" type="slidenum">
+              <a:rPr lang="en-SG" smtClean="0"/>
               <a:t>‹#›</a:t>
             </a:fld>
-            <a:endParaRPr lang="en-US"/>
+            <a:endParaRPr lang="en-SG"/>
           </a:p>
         </p:txBody>
       </p:sp>
     </p:spTree>
+    <p:extLst>
+      <p:ext uri="{BB962C8B-B14F-4D97-AF65-F5344CB8AC3E}">
+        <p14:creationId xmlns:p14="http://schemas.microsoft.com/office/powerpoint/2010/main" val="3909473291"/>
+      </p:ext>
+    </p:extLst>
   </p:cSld>
   <p:clrMapOvr>
     <a:masterClrMapping/>
@@ -2364,7 +1975,11 @@
           <a:bodyPr/>
           <a:lstStyle/>
           <a:p>
-            <a:endParaRPr lang="en-US"/>
+            <a:fld id="{A0F86979-30DA-49EE-A740-32EBA6D2B7DE}" type="datetimeFigureOut">
+              <a:rPr lang="en-SG" smtClean="0"/>
+              <a:t>2/6/2017</a:t>
+            </a:fld>
+            <a:endParaRPr lang="en-SG"/>
           </a:p>
         </p:txBody>
       </p:sp>
@@ -2383,7 +1998,7 @@
           <a:bodyPr/>
           <a:lstStyle/>
           <a:p>
-            <a:endParaRPr lang="en-US"/>
+            <a:endParaRPr lang="en-SG"/>
           </a:p>
         </p:txBody>
       </p:sp>
@@ -2402,16 +2017,20 @@
           <a:bodyPr/>
           <a:lstStyle/>
           <a:p>
-            <a:fld id="{5B8905EB-9186-4B9B-BEF9-C6B1CD50847D}" type="slidenum">
-              <a:rPr lang="en-US" smtClean="0"/>
-              <a:pPr/>
+            <a:fld id="{EBF7C7F7-E270-4260-A412-76A75D6182AD}" type="slidenum">
+              <a:rPr lang="en-SG" smtClean="0"/>
               <a:t>‹#›</a:t>
             </a:fld>
-            <a:endParaRPr lang="en-US"/>
+            <a:endParaRPr lang="en-SG"/>
           </a:p>
         </p:txBody>
       </p:sp>
     </p:spTree>
+    <p:extLst>
+      <p:ext uri="{BB962C8B-B14F-4D97-AF65-F5344CB8AC3E}">
+        <p14:creationId xmlns:p14="http://schemas.microsoft.com/office/powerpoint/2010/main" val="3259271892"/>
+      </p:ext>
+    </p:extLst>
   </p:cSld>
   <p:clrMapOvr>
     <a:masterClrMapping/>
@@ -2464,7 +2083,7 @@
               <a:rPr lang="en-US" smtClean="0"/>
               <a:t>Click to edit Master title style</a:t>
             </a:r>
-            <a:endParaRPr lang="en-US"/>
+            <a:endParaRPr lang="en-SG"/>
           </a:p>
         </p:txBody>
       </p:sp>
@@ -2549,7 +2168,7 @@
               <a:rPr lang="en-US" smtClean="0"/>
               <a:t>Fifth level</a:t>
             </a:r>
-            <a:endParaRPr lang="en-US"/>
+            <a:endParaRPr lang="en-SG"/>
           </a:p>
         </p:txBody>
       </p:sp>
@@ -2633,7 +2252,11 @@
           <a:bodyPr/>
           <a:lstStyle/>
           <a:p>
-            <a:endParaRPr lang="en-US"/>
+            <a:fld id="{A0F86979-30DA-49EE-A740-32EBA6D2B7DE}" type="datetimeFigureOut">
+              <a:rPr lang="en-SG" smtClean="0"/>
+              <a:t>2/6/2017</a:t>
+            </a:fld>
+            <a:endParaRPr lang="en-SG"/>
           </a:p>
         </p:txBody>
       </p:sp>
@@ -2652,7 +2275,7 @@
           <a:bodyPr/>
           <a:lstStyle/>
           <a:p>
-            <a:endParaRPr lang="en-US"/>
+            <a:endParaRPr lang="en-SG"/>
           </a:p>
         </p:txBody>
       </p:sp>
@@ -2671,16 +2294,20 @@
           <a:bodyPr/>
           <a:lstStyle/>
           <a:p>
-            <a:fld id="{5B8905EB-9186-4B9B-BEF9-C6B1CD50847D}" type="slidenum">
-              <a:rPr lang="en-US" smtClean="0"/>
-              <a:pPr/>
+            <a:fld id="{EBF7C7F7-E270-4260-A412-76A75D6182AD}" type="slidenum">
+              <a:rPr lang="en-SG" smtClean="0"/>
               <a:t>‹#›</a:t>
             </a:fld>
-            <a:endParaRPr lang="en-US"/>
+            <a:endParaRPr lang="en-SG"/>
           </a:p>
         </p:txBody>
       </p:sp>
     </p:spTree>
+    <p:extLst>
+      <p:ext uri="{BB962C8B-B14F-4D97-AF65-F5344CB8AC3E}">
+        <p14:creationId xmlns:p14="http://schemas.microsoft.com/office/powerpoint/2010/main" val="2859859922"/>
+      </p:ext>
+    </p:extLst>
   </p:cSld>
   <p:clrMapOvr>
     <a:masterClrMapping/>
@@ -2733,7 +2360,7 @@
               <a:rPr lang="en-US" smtClean="0"/>
               <a:t>Click to edit Master title style</a:t>
             </a:r>
-            <a:endParaRPr lang="en-US"/>
+            <a:endParaRPr lang="en-SG"/>
           </a:p>
         </p:txBody>
       </p:sp>
@@ -2794,7 +2421,7 @@
             </a:lvl9pPr>
           </a:lstStyle>
           <a:p>
-            <a:endParaRPr lang="en-US"/>
+            <a:endParaRPr lang="en-SG"/>
           </a:p>
         </p:txBody>
       </p:sp>
@@ -2878,7 +2505,11 @@
           <a:bodyPr/>
           <a:lstStyle/>
           <a:p>
-            <a:endParaRPr lang="en-US"/>
+            <a:fld id="{A0F86979-30DA-49EE-A740-32EBA6D2B7DE}" type="datetimeFigureOut">
+              <a:rPr lang="en-SG" smtClean="0"/>
+              <a:t>2/6/2017</a:t>
+            </a:fld>
+            <a:endParaRPr lang="en-SG"/>
           </a:p>
         </p:txBody>
       </p:sp>
@@ -2897,7 +2528,7 @@
           <a:bodyPr/>
           <a:lstStyle/>
           <a:p>
-            <a:endParaRPr lang="en-US"/>
+            <a:endParaRPr lang="en-SG"/>
           </a:p>
         </p:txBody>
       </p:sp>
@@ -2916,16 +2547,20 @@
           <a:bodyPr/>
           <a:lstStyle/>
           <a:p>
-            <a:fld id="{5B8905EB-9186-4B9B-BEF9-C6B1CD50847D}" type="slidenum">
-              <a:rPr lang="en-US" smtClean="0"/>
-              <a:pPr/>
+            <a:fld id="{EBF7C7F7-E270-4260-A412-76A75D6182AD}" type="slidenum">
+              <a:rPr lang="en-SG" smtClean="0"/>
               <a:t>‹#›</a:t>
             </a:fld>
-            <a:endParaRPr lang="en-US"/>
+            <a:endParaRPr lang="en-SG"/>
           </a:p>
         </p:txBody>
       </p:sp>
     </p:spTree>
+    <p:extLst>
+      <p:ext uri="{BB962C8B-B14F-4D97-AF65-F5344CB8AC3E}">
+        <p14:creationId xmlns:p14="http://schemas.microsoft.com/office/powerpoint/2010/main" val="1672414452"/>
+      </p:ext>
+    </p:extLst>
   </p:cSld>
   <p:clrMapOvr>
     <a:masterClrMapping/>
@@ -2984,7 +2619,7 @@
               <a:rPr lang="en-US" smtClean="0"/>
               <a:t>Click to edit Master title style</a:t>
             </a:r>
-            <a:endParaRPr lang="en-US"/>
+            <a:endParaRPr lang="en-SG"/>
           </a:p>
         </p:txBody>
       </p:sp>
@@ -3046,7 +2681,7 @@
               <a:rPr lang="en-US" smtClean="0"/>
               <a:t>Fifth level</a:t>
             </a:r>
-            <a:endParaRPr lang="en-US"/>
+            <a:endParaRPr lang="en-SG"/>
           </a:p>
         </p:txBody>
       </p:sp>
@@ -3083,7 +2718,11 @@
             </a:lvl1pPr>
           </a:lstStyle>
           <a:p>
-            <a:endParaRPr lang="en-US"/>
+            <a:fld id="{A0F86979-30DA-49EE-A740-32EBA6D2B7DE}" type="datetimeFigureOut">
+              <a:rPr lang="en-SG" smtClean="0"/>
+              <a:t>2/6/2017</a:t>
+            </a:fld>
+            <a:endParaRPr lang="en-SG"/>
           </a:p>
         </p:txBody>
       </p:sp>
@@ -3120,7 +2759,7 @@
             </a:lvl1pPr>
           </a:lstStyle>
           <a:p>
-            <a:endParaRPr lang="en-US"/>
+            <a:endParaRPr lang="en-SG"/>
           </a:p>
         </p:txBody>
       </p:sp>
@@ -3157,16 +2796,20 @@
             </a:lvl1pPr>
           </a:lstStyle>
           <a:p>
-            <a:fld id="{5B8905EB-9186-4B9B-BEF9-C6B1CD50847D}" type="slidenum">
-              <a:rPr lang="en-US" smtClean="0"/>
-              <a:pPr/>
+            <a:fld id="{EBF7C7F7-E270-4260-A412-76A75D6182AD}" type="slidenum">
+              <a:rPr lang="en-SG" smtClean="0"/>
               <a:t>‹#›</a:t>
             </a:fld>
-            <a:endParaRPr lang="en-US"/>
+            <a:endParaRPr lang="en-SG"/>
           </a:p>
         </p:txBody>
       </p:sp>
     </p:spTree>
+    <p:extLst>
+      <p:ext uri="{BB962C8B-B14F-4D97-AF65-F5344CB8AC3E}">
+        <p14:creationId xmlns:p14="http://schemas.microsoft.com/office/powerpoint/2010/main" val="1974023683"/>
+      </p:ext>
+    </p:extLst>
   </p:cSld>
   <p:clrMap bg1="lt1" tx1="dk1" bg2="lt2" tx2="dk2" accent1="accent1" accent2="accent2" accent3="accent3" accent4="accent4" accent5="accent5" accent6="accent6" hlink="hlink" folHlink="folHlink"/>
   <p:sldLayoutIdLst>
@@ -3182,7 +2825,6 @@
     <p:sldLayoutId id="2147483658" r:id="rId10"/>
     <p:sldLayoutId id="2147483659" r:id="rId11"/>
   </p:sldLayoutIdLst>
-  <p:hf hdr="0" ftr="0" dt="0"/>
   <p:txStyles>
     <p:titleStyle>
       <a:lvl1pPr algn="ctr" defTabSz="914400" rtl="0" eaLnBrk="1" latinLnBrk="0" hangingPunct="1">
@@ -3205,7 +2847,7 @@
         <a:spcBef>
           <a:spcPct val="20000"/>
         </a:spcBef>
-        <a:buFont typeface="Arial" pitchFamily="34" charset="0"/>
+        <a:buFont typeface="Arial" panose="020B0604020202020204" pitchFamily="34" charset="0"/>
         <a:buChar char="•"/>
         <a:defRPr sz="3200" kern="1200">
           <a:solidFill>
@@ -3220,7 +2862,7 @@
         <a:spcBef>
           <a:spcPct val="20000"/>
         </a:spcBef>
-        <a:buFont typeface="Arial" pitchFamily="34" charset="0"/>
+        <a:buFont typeface="Arial" panose="020B0604020202020204" pitchFamily="34" charset="0"/>
         <a:buChar char="–"/>
         <a:defRPr sz="2800" kern="1200">
           <a:solidFill>
@@ -3235,7 +2877,7 @@
         <a:spcBef>
           <a:spcPct val="20000"/>
         </a:spcBef>
-        <a:buFont typeface="Arial" pitchFamily="34" charset="0"/>
+        <a:buFont typeface="Arial" panose="020B0604020202020204" pitchFamily="34" charset="0"/>
         <a:buChar char="•"/>
         <a:defRPr sz="2400" kern="1200">
           <a:solidFill>
@@ -3250,7 +2892,7 @@
         <a:spcBef>
           <a:spcPct val="20000"/>
         </a:spcBef>
-        <a:buFont typeface="Arial" pitchFamily="34" charset="0"/>
+        <a:buFont typeface="Arial" panose="020B0604020202020204" pitchFamily="34" charset="0"/>
         <a:buChar char="–"/>
         <a:defRPr sz="2000" kern="1200">
           <a:solidFill>
@@ -3265,7 +2907,7 @@
         <a:spcBef>
           <a:spcPct val="20000"/>
         </a:spcBef>
-        <a:buFont typeface="Arial" pitchFamily="34" charset="0"/>
+        <a:buFont typeface="Arial" panose="020B0604020202020204" pitchFamily="34" charset="0"/>
         <a:buChar char="»"/>
         <a:defRPr sz="2000" kern="1200">
           <a:solidFill>
@@ -3280,7 +2922,7 @@
         <a:spcBef>
           <a:spcPct val="20000"/>
         </a:spcBef>
-        <a:buFont typeface="Arial" pitchFamily="34" charset="0"/>
+        <a:buFont typeface="Arial" panose="020B0604020202020204" pitchFamily="34" charset="0"/>
         <a:buChar char="•"/>
         <a:defRPr sz="2000" kern="1200">
           <a:solidFill>
@@ -3295,7 +2937,7 @@
         <a:spcBef>
           <a:spcPct val="20000"/>
         </a:spcBef>
-        <a:buFont typeface="Arial" pitchFamily="34" charset="0"/>
+        <a:buFont typeface="Arial" panose="020B0604020202020204" pitchFamily="34" charset="0"/>
         <a:buChar char="•"/>
         <a:defRPr sz="2000" kern="1200">
           <a:solidFill>
@@ -3310,7 +2952,7 @@
         <a:spcBef>
           <a:spcPct val="20000"/>
         </a:spcBef>
-        <a:buFont typeface="Arial" pitchFamily="34" charset="0"/>
+        <a:buFont typeface="Arial" panose="020B0604020202020204" pitchFamily="34" charset="0"/>
         <a:buChar char="•"/>
         <a:defRPr sz="2000" kern="1200">
           <a:solidFill>
@@ -3325,7 +2967,7 @@
         <a:spcBef>
           <a:spcPct val="20000"/>
         </a:spcBef>
-        <a:buFont typeface="Arial" pitchFamily="34" charset="0"/>
+        <a:buFont typeface="Arial" panose="020B0604020202020204" pitchFamily="34" charset="0"/>
         <a:buChar char="•"/>
         <a:defRPr sz="2000" kern="1200">
           <a:solidFill>
@@ -3455,7 +3097,7 @@
       </p:grpSpPr>
       <p:sp>
         <p:nvSpPr>
-          <p:cNvPr id="5" name="Content Placeholder 2"/>
+          <p:cNvPr id="289" name="Content Placeholder 2"/>
           <p:cNvSpPr txBox="1">
             <a:spLocks/>
           </p:cNvSpPr>
@@ -4558,7 +4200,7 @@
       </p:sp>
       <p:sp>
         <p:nvSpPr>
-          <p:cNvPr id="6" name="Content Placeholder 6"/>
+          <p:cNvPr id="290" name="Content Placeholder 6"/>
           <p:cNvSpPr txBox="1">
             <a:spLocks/>
           </p:cNvSpPr>
@@ -5677,7 +5319,7 @@
       </p:sp>
       <p:sp>
         <p:nvSpPr>
-          <p:cNvPr id="7" name="Rectangle 1"/>
+          <p:cNvPr id="291" name="Rectangle 1"/>
           <p:cNvSpPr>
             <a:spLocks noChangeArrowheads="1"/>
           </p:cNvSpPr>
@@ -5792,7 +5434,7 @@
       </p:sp>
       <p:cxnSp>
         <p:nvCxnSpPr>
-          <p:cNvPr id="8" name="Straight Connector 7"/>
+          <p:cNvPr id="292" name="Straight Connector 291"/>
           <p:cNvCxnSpPr/>
           <p:nvPr/>
         </p:nvCxnSpPr>
@@ -5821,6 +5463,11 @@
         </p:style>
       </p:cxnSp>
     </p:spTree>
+    <p:extLst>
+      <p:ext uri="{BB962C8B-B14F-4D97-AF65-F5344CB8AC3E}">
+        <p14:creationId xmlns:p14="http://schemas.microsoft.com/office/powerpoint/2010/main" val="26466125"/>
+      </p:ext>
+    </p:extLst>
   </p:cSld>
   <p:clrMapOvr>
     <a:masterClrMapping/>
@@ -5910,6 +5557,7 @@
         <a:font script="Mong" typeface="Mongolian Baiti"/>
         <a:font script="Viet" typeface="Times New Roman"/>
         <a:font script="Uigh" typeface="Microsoft Uighur"/>
+        <a:font script="Geor" typeface="Sylfaen"/>
       </a:majorFont>
       <a:minorFont>
         <a:latin typeface="Calibri"/>
@@ -5944,289 +5592,7 @@
         <a:font script="Mong" typeface="Mongolian Baiti"/>
         <a:font script="Viet" typeface="Arial"/>
         <a:font script="Uigh" typeface="Microsoft Uighur"/>
-      </a:minorFont>
-    </a:fontScheme>
-    <a:fmtScheme name="Office">
-      <a:fillStyleLst>
-        <a:solidFill>
-          <a:schemeClr val="phClr"/>
-        </a:solidFill>
-        <a:gradFill rotWithShape="1">
-          <a:gsLst>
-            <a:gs pos="0">
-              <a:schemeClr val="phClr">
-                <a:tint val="50000"/>
-                <a:satMod val="300000"/>
-              </a:schemeClr>
-            </a:gs>
-            <a:gs pos="35000">
-              <a:schemeClr val="phClr">
-                <a:tint val="37000"/>
-                <a:satMod val="300000"/>
-              </a:schemeClr>
-            </a:gs>
-            <a:gs pos="100000">
-              <a:schemeClr val="phClr">
-                <a:tint val="15000"/>
-                <a:satMod val="350000"/>
-              </a:schemeClr>
-            </a:gs>
-          </a:gsLst>
-          <a:lin ang="16200000" scaled="1"/>
-        </a:gradFill>
-        <a:gradFill rotWithShape="1">
-          <a:gsLst>
-            <a:gs pos="0">
-              <a:schemeClr val="phClr">
-                <a:shade val="51000"/>
-                <a:satMod val="130000"/>
-              </a:schemeClr>
-            </a:gs>
-            <a:gs pos="80000">
-              <a:schemeClr val="phClr">
-                <a:shade val="93000"/>
-                <a:satMod val="130000"/>
-              </a:schemeClr>
-            </a:gs>
-            <a:gs pos="100000">
-              <a:schemeClr val="phClr">
-                <a:shade val="94000"/>
-                <a:satMod val="135000"/>
-              </a:schemeClr>
-            </a:gs>
-          </a:gsLst>
-          <a:lin ang="16200000" scaled="0"/>
-        </a:gradFill>
-      </a:fillStyleLst>
-      <a:lnStyleLst>
-        <a:ln w="9525" cap="flat" cmpd="sng" algn="ctr">
-          <a:solidFill>
-            <a:schemeClr val="phClr">
-              <a:shade val="95000"/>
-              <a:satMod val="105000"/>
-            </a:schemeClr>
-          </a:solidFill>
-          <a:prstDash val="solid"/>
-        </a:ln>
-        <a:ln w="25400" cap="flat" cmpd="sng" algn="ctr">
-          <a:solidFill>
-            <a:schemeClr val="phClr"/>
-          </a:solidFill>
-          <a:prstDash val="solid"/>
-        </a:ln>
-        <a:ln w="38100" cap="flat" cmpd="sng" algn="ctr">
-          <a:solidFill>
-            <a:schemeClr val="phClr"/>
-          </a:solidFill>
-          <a:prstDash val="solid"/>
-        </a:ln>
-      </a:lnStyleLst>
-      <a:effectStyleLst>
-        <a:effectStyle>
-          <a:effectLst>
-            <a:outerShdw blurRad="40000" dist="20000" dir="5400000" rotWithShape="0">
-              <a:srgbClr val="000000">
-                <a:alpha val="38000"/>
-              </a:srgbClr>
-            </a:outerShdw>
-          </a:effectLst>
-        </a:effectStyle>
-        <a:effectStyle>
-          <a:effectLst>
-            <a:outerShdw blurRad="40000" dist="23000" dir="5400000" rotWithShape="0">
-              <a:srgbClr val="000000">
-                <a:alpha val="35000"/>
-              </a:srgbClr>
-            </a:outerShdw>
-          </a:effectLst>
-        </a:effectStyle>
-        <a:effectStyle>
-          <a:effectLst>
-            <a:outerShdw blurRad="40000" dist="23000" dir="5400000" rotWithShape="0">
-              <a:srgbClr val="000000">
-                <a:alpha val="35000"/>
-              </a:srgbClr>
-            </a:outerShdw>
-          </a:effectLst>
-          <a:scene3d>
-            <a:camera prst="orthographicFront">
-              <a:rot lat="0" lon="0" rev="0"/>
-            </a:camera>
-            <a:lightRig rig="threePt" dir="t">
-              <a:rot lat="0" lon="0" rev="1200000"/>
-            </a:lightRig>
-          </a:scene3d>
-          <a:sp3d>
-            <a:bevelT w="63500" h="25400"/>
-          </a:sp3d>
-        </a:effectStyle>
-      </a:effectStyleLst>
-      <a:bgFillStyleLst>
-        <a:solidFill>
-          <a:schemeClr val="phClr"/>
-        </a:solidFill>
-        <a:gradFill rotWithShape="1">
-          <a:gsLst>
-            <a:gs pos="0">
-              <a:schemeClr val="phClr">
-                <a:tint val="40000"/>
-                <a:satMod val="350000"/>
-              </a:schemeClr>
-            </a:gs>
-            <a:gs pos="40000">
-              <a:schemeClr val="phClr">
-                <a:tint val="45000"/>
-                <a:shade val="99000"/>
-                <a:satMod val="350000"/>
-              </a:schemeClr>
-            </a:gs>
-            <a:gs pos="100000">
-              <a:schemeClr val="phClr">
-                <a:shade val="20000"/>
-                <a:satMod val="255000"/>
-              </a:schemeClr>
-            </a:gs>
-          </a:gsLst>
-          <a:path path="circle">
-            <a:fillToRect l="50000" t="-80000" r="50000" b="180000"/>
-          </a:path>
-        </a:gradFill>
-        <a:gradFill rotWithShape="1">
-          <a:gsLst>
-            <a:gs pos="0">
-              <a:schemeClr val="phClr">
-                <a:tint val="80000"/>
-                <a:satMod val="300000"/>
-              </a:schemeClr>
-            </a:gs>
-            <a:gs pos="100000">
-              <a:schemeClr val="phClr">
-                <a:shade val="30000"/>
-                <a:satMod val="200000"/>
-              </a:schemeClr>
-            </a:gs>
-          </a:gsLst>
-          <a:path path="circle">
-            <a:fillToRect l="50000" t="50000" r="50000" b="50000"/>
-          </a:path>
-        </a:gradFill>
-      </a:bgFillStyleLst>
-    </a:fmtScheme>
-  </a:themeElements>
-  <a:objectDefaults/>
-  <a:extraClrSchemeLst/>
-</a:theme>
-</file>
-
-<file path=ppt/theme/theme2.xml><?xml version="1.0" encoding="utf-8"?>
-<a:theme xmlns:a="http://schemas.openxmlformats.org/drawingml/2006/main" name="Office Theme">
-  <a:themeElements>
-    <a:clrScheme name="Office">
-      <a:dk1>
-        <a:sysClr val="windowText" lastClr="000000"/>
-      </a:dk1>
-      <a:lt1>
-        <a:sysClr val="window" lastClr="FFFFFF"/>
-      </a:lt1>
-      <a:dk2>
-        <a:srgbClr val="1F497D"/>
-      </a:dk2>
-      <a:lt2>
-        <a:srgbClr val="EEECE1"/>
-      </a:lt2>
-      <a:accent1>
-        <a:srgbClr val="4F81BD"/>
-      </a:accent1>
-      <a:accent2>
-        <a:srgbClr val="C0504D"/>
-      </a:accent2>
-      <a:accent3>
-        <a:srgbClr val="9BBB59"/>
-      </a:accent3>
-      <a:accent4>
-        <a:srgbClr val="8064A2"/>
-      </a:accent4>
-      <a:accent5>
-        <a:srgbClr val="4BACC6"/>
-      </a:accent5>
-      <a:accent6>
-        <a:srgbClr val="F79646"/>
-      </a:accent6>
-      <a:hlink>
-        <a:srgbClr val="0000FF"/>
-      </a:hlink>
-      <a:folHlink>
-        <a:srgbClr val="800080"/>
-      </a:folHlink>
-    </a:clrScheme>
-    <a:fontScheme name="Office">
-      <a:majorFont>
-        <a:latin typeface="Calibri"/>
-        <a:ea typeface=""/>
-        <a:cs typeface=""/>
-        <a:font script="Jpan" typeface="ＭＳ Ｐゴシック"/>
-        <a:font script="Hang" typeface="맑은 고딕"/>
-        <a:font script="Hans" typeface="宋体"/>
-        <a:font script="Hant" typeface="新細明體"/>
-        <a:font script="Arab" typeface="Times New Roman"/>
-        <a:font script="Hebr" typeface="Times New Roman"/>
-        <a:font script="Thai" typeface="Angsana New"/>
-        <a:font script="Ethi" typeface="Nyala"/>
-        <a:font script="Beng" typeface="Vrinda"/>
-        <a:font script="Gujr" typeface="Shruti"/>
-        <a:font script="Khmr" typeface="MoolBoran"/>
-        <a:font script="Knda" typeface="Tunga"/>
-        <a:font script="Guru" typeface="Raavi"/>
-        <a:font script="Cans" typeface="Euphemia"/>
-        <a:font script="Cher" typeface="Plantagenet Cherokee"/>
-        <a:font script="Yiii" typeface="Microsoft Yi Baiti"/>
-        <a:font script="Tibt" typeface="Microsoft Himalaya"/>
-        <a:font script="Thaa" typeface="MV Boli"/>
-        <a:font script="Deva" typeface="Mangal"/>
-        <a:font script="Telu" typeface="Gautami"/>
-        <a:font script="Taml" typeface="Latha"/>
-        <a:font script="Syrc" typeface="Estrangelo Edessa"/>
-        <a:font script="Orya" typeface="Kalinga"/>
-        <a:font script="Mlym" typeface="Kartika"/>
-        <a:font script="Laoo" typeface="DokChampa"/>
-        <a:font script="Sinh" typeface="Iskoola Pota"/>
-        <a:font script="Mong" typeface="Mongolian Baiti"/>
-        <a:font script="Viet" typeface="Times New Roman"/>
-        <a:font script="Uigh" typeface="Microsoft Uighur"/>
-      </a:majorFont>
-      <a:minorFont>
-        <a:latin typeface="Calibri"/>
-        <a:ea typeface=""/>
-        <a:cs typeface=""/>
-        <a:font script="Jpan" typeface="ＭＳ Ｐゴシック"/>
-        <a:font script="Hang" typeface="맑은 고딕"/>
-        <a:font script="Hans" typeface="宋体"/>
-        <a:font script="Hant" typeface="新細明體"/>
-        <a:font script="Arab" typeface="Arial"/>
-        <a:font script="Hebr" typeface="Arial"/>
-        <a:font script="Thai" typeface="Cordia New"/>
-        <a:font script="Ethi" typeface="Nyala"/>
-        <a:font script="Beng" typeface="Vrinda"/>
-        <a:font script="Gujr" typeface="Shruti"/>
-        <a:font script="Khmr" typeface="DaunPenh"/>
-        <a:font script="Knda" typeface="Tunga"/>
-        <a:font script="Guru" typeface="Raavi"/>
-        <a:font script="Cans" typeface="Euphemia"/>
-        <a:font script="Cher" typeface="Plantagenet Cherokee"/>
-        <a:font script="Yiii" typeface="Microsoft Yi Baiti"/>
-        <a:font script="Tibt" typeface="Microsoft Himalaya"/>
-        <a:font script="Thaa" typeface="MV Boli"/>
-        <a:font script="Deva" typeface="Mangal"/>
-        <a:font script="Telu" typeface="Gautami"/>
-        <a:font script="Taml" typeface="Latha"/>
-        <a:font script="Syrc" typeface="Estrangelo Edessa"/>
-        <a:font script="Orya" typeface="Kalinga"/>
-        <a:font script="Mlym" typeface="Kartika"/>
-        <a:font script="Laoo" typeface="DokChampa"/>
-        <a:font script="Sinh" typeface="Iskoola Pota"/>
-        <a:font script="Mong" typeface="Mongolian Baiti"/>
-        <a:font script="Viet" typeface="Arial"/>
-        <a:font script="Uigh" typeface="Microsoft Uighur"/>
+        <a:font script="Geor" typeface="Sylfaen"/>
       </a:minorFont>
     </a:fontScheme>
     <a:fmtScheme name="Office">

</xml_diff>